<commit_message>
versão final do TCC
</commit_message>
<xml_diff>
--- a/Textos/ApresentacaoTCC-DjonathanKrause.pptx
+++ b/Textos/ApresentacaoTCC-DjonathanKrause.pptx
@@ -4,19 +4,27 @@
   <p:sldMasterIdLst>
     <p:sldMasterId id="2147483648" r:id="rId1"/>
   </p:sldMasterIdLst>
+  <p:notesMasterIdLst>
+    <p:notesMasterId r:id="rId19"/>
+  </p:notesMasterIdLst>
   <p:sldIdLst>
     <p:sldId id="257" r:id="rId2"/>
     <p:sldId id="258" r:id="rId3"/>
     <p:sldId id="259" r:id="rId4"/>
     <p:sldId id="260" r:id="rId5"/>
     <p:sldId id="261" r:id="rId6"/>
-    <p:sldId id="262" r:id="rId7"/>
-    <p:sldId id="263" r:id="rId8"/>
-    <p:sldId id="264" r:id="rId9"/>
-    <p:sldId id="265" r:id="rId10"/>
-    <p:sldId id="266" r:id="rId11"/>
-    <p:sldId id="267" r:id="rId12"/>
-    <p:sldId id="268" r:id="rId13"/>
+    <p:sldId id="269" r:id="rId7"/>
+    <p:sldId id="270" r:id="rId8"/>
+    <p:sldId id="271" r:id="rId9"/>
+    <p:sldId id="272" r:id="rId10"/>
+    <p:sldId id="262" r:id="rId11"/>
+    <p:sldId id="263" r:id="rId12"/>
+    <p:sldId id="264" r:id="rId13"/>
+    <p:sldId id="265" r:id="rId14"/>
+    <p:sldId id="273" r:id="rId15"/>
+    <p:sldId id="266" r:id="rId16"/>
+    <p:sldId id="267" r:id="rId17"/>
+    <p:sldId id="268" r:id="rId18"/>
   </p:sldIdLst>
   <p:sldSz cx="9144000" cy="6858000" type="screen4x3"/>
   <p:notesSz cx="6858000" cy="9144000"/>
@@ -145,7 +153,1468 @@
       </a:defRPr>
     </a:lvl9pPr>
   </p:defaultTextStyle>
+  <p:extLst>
+    <p:ext uri="{EFAFB233-063F-42B5-8137-9DF3F51BA10A}">
+      <p15:sldGuideLst xmlns:p15="http://schemas.microsoft.com/office/powerpoint/2012/main">
+        <p15:guide id="1" orient="horz" pos="2160">
+          <p15:clr>
+            <a:srgbClr val="A4A3A4"/>
+          </p15:clr>
+        </p15:guide>
+        <p15:guide id="2" pos="2880">
+          <p15:clr>
+            <a:srgbClr val="A4A3A4"/>
+          </p15:clr>
+        </p15:guide>
+      </p15:sldGuideLst>
+    </p:ext>
+  </p:extLst>
 </p:presentation>
+</file>
+
+<file path=ppt/notesMasters/notesMaster1.xml><?xml version="1.0" encoding="utf-8"?>
+<p:notesMaster xmlns:a="http://schemas.openxmlformats.org/drawingml/2006/main" xmlns:r="http://schemas.openxmlformats.org/officeDocument/2006/relationships" xmlns:p="http://schemas.openxmlformats.org/presentationml/2006/main">
+  <p:cSld>
+    <p:bg>
+      <p:bgRef idx="1001">
+        <a:schemeClr val="bg1"/>
+      </p:bgRef>
+    </p:bg>
+    <p:spTree>
+      <p:nvGrpSpPr>
+        <p:cNvPr id="1" name=""/>
+        <p:cNvGrpSpPr/>
+        <p:nvPr/>
+      </p:nvGrpSpPr>
+      <p:grpSpPr>
+        <a:xfrm>
+          <a:off x="0" y="0"/>
+          <a:ext cx="0" cy="0"/>
+          <a:chOff x="0" y="0"/>
+          <a:chExt cx="0" cy="0"/>
+        </a:xfrm>
+      </p:grpSpPr>
+      <p:sp>
+        <p:nvSpPr>
+          <p:cNvPr id="2" name="Header Placeholder 1"/>
+          <p:cNvSpPr>
+            <a:spLocks noGrp="1"/>
+          </p:cNvSpPr>
+          <p:nvPr>
+            <p:ph type="hdr" sz="quarter"/>
+          </p:nvPr>
+        </p:nvSpPr>
+        <p:spPr>
+          <a:xfrm>
+            <a:off x="0" y="0"/>
+            <a:ext cx="2971800" cy="458788"/>
+          </a:xfrm>
+          <a:prstGeom prst="rect">
+            <a:avLst/>
+          </a:prstGeom>
+        </p:spPr>
+        <p:txBody>
+          <a:bodyPr vert="horz" lIns="91440" tIns="45720" rIns="91440" bIns="45720" rtlCol="0"/>
+          <a:lstStyle>
+            <a:lvl1pPr algn="l">
+              <a:defRPr sz="1200"/>
+            </a:lvl1pPr>
+          </a:lstStyle>
+          <a:p>
+            <a:endParaRPr lang="pt-BR"/>
+          </a:p>
+        </p:txBody>
+      </p:sp>
+      <p:sp>
+        <p:nvSpPr>
+          <p:cNvPr id="3" name="Date Placeholder 2"/>
+          <p:cNvSpPr>
+            <a:spLocks noGrp="1"/>
+          </p:cNvSpPr>
+          <p:nvPr>
+            <p:ph type="dt" idx="1"/>
+          </p:nvPr>
+        </p:nvSpPr>
+        <p:spPr>
+          <a:xfrm>
+            <a:off x="3884613" y="0"/>
+            <a:ext cx="2971800" cy="458788"/>
+          </a:xfrm>
+          <a:prstGeom prst="rect">
+            <a:avLst/>
+          </a:prstGeom>
+        </p:spPr>
+        <p:txBody>
+          <a:bodyPr vert="horz" lIns="91440" tIns="45720" rIns="91440" bIns="45720" rtlCol="0"/>
+          <a:lstStyle>
+            <a:lvl1pPr algn="r">
+              <a:defRPr sz="1200"/>
+            </a:lvl1pPr>
+          </a:lstStyle>
+          <a:p>
+            <a:fld id="{B9715F7E-051F-4253-9064-77459454DA3F}" type="datetimeFigureOut">
+              <a:rPr lang="pt-BR" smtClean="0"/>
+              <a:t>03/12/2018</a:t>
+            </a:fld>
+            <a:endParaRPr lang="pt-BR"/>
+          </a:p>
+        </p:txBody>
+      </p:sp>
+      <p:sp>
+        <p:nvSpPr>
+          <p:cNvPr id="4" name="Slide Image Placeholder 3"/>
+          <p:cNvSpPr>
+            <a:spLocks noGrp="1" noRot="1" noChangeAspect="1"/>
+          </p:cNvSpPr>
+          <p:nvPr>
+            <p:ph type="sldImg" idx="2"/>
+          </p:nvPr>
+        </p:nvSpPr>
+        <p:spPr>
+          <a:xfrm>
+            <a:off x="1371600" y="1143000"/>
+            <a:ext cx="4114800" cy="3086100"/>
+          </a:xfrm>
+          <a:prstGeom prst="rect">
+            <a:avLst/>
+          </a:prstGeom>
+          <a:noFill/>
+          <a:ln w="12700">
+            <a:solidFill>
+              <a:prstClr val="black"/>
+            </a:solidFill>
+          </a:ln>
+        </p:spPr>
+        <p:txBody>
+          <a:bodyPr vert="horz" lIns="91440" tIns="45720" rIns="91440" bIns="45720" rtlCol="0" anchor="ctr"/>
+          <a:lstStyle/>
+          <a:p>
+            <a:endParaRPr lang="pt-BR"/>
+          </a:p>
+        </p:txBody>
+      </p:sp>
+      <p:sp>
+        <p:nvSpPr>
+          <p:cNvPr id="5" name="Notes Placeholder 4"/>
+          <p:cNvSpPr>
+            <a:spLocks noGrp="1"/>
+          </p:cNvSpPr>
+          <p:nvPr>
+            <p:ph type="body" sz="quarter" idx="3"/>
+          </p:nvPr>
+        </p:nvSpPr>
+        <p:spPr>
+          <a:xfrm>
+            <a:off x="685800" y="4400550"/>
+            <a:ext cx="5486400" cy="3600450"/>
+          </a:xfrm>
+          <a:prstGeom prst="rect">
+            <a:avLst/>
+          </a:prstGeom>
+        </p:spPr>
+        <p:txBody>
+          <a:bodyPr vert="horz" lIns="91440" tIns="45720" rIns="91440" bIns="45720" rtlCol="0"/>
+          <a:lstStyle/>
+          <a:p>
+            <a:pPr lvl="0"/>
+            <a:r>
+              <a:rPr lang="en-US" smtClean="0"/>
+              <a:t>Edit Master text styles</a:t>
+            </a:r>
+          </a:p>
+          <a:p>
+            <a:pPr lvl="1"/>
+            <a:r>
+              <a:rPr lang="en-US" smtClean="0"/>
+              <a:t>Second level</a:t>
+            </a:r>
+          </a:p>
+          <a:p>
+            <a:pPr lvl="2"/>
+            <a:r>
+              <a:rPr lang="en-US" smtClean="0"/>
+              <a:t>Third level</a:t>
+            </a:r>
+          </a:p>
+          <a:p>
+            <a:pPr lvl="3"/>
+            <a:r>
+              <a:rPr lang="en-US" smtClean="0"/>
+              <a:t>Fourth level</a:t>
+            </a:r>
+          </a:p>
+          <a:p>
+            <a:pPr lvl="4"/>
+            <a:r>
+              <a:rPr lang="en-US" smtClean="0"/>
+              <a:t>Fifth level</a:t>
+            </a:r>
+            <a:endParaRPr lang="pt-BR"/>
+          </a:p>
+        </p:txBody>
+      </p:sp>
+      <p:sp>
+        <p:nvSpPr>
+          <p:cNvPr id="6" name="Footer Placeholder 5"/>
+          <p:cNvSpPr>
+            <a:spLocks noGrp="1"/>
+          </p:cNvSpPr>
+          <p:nvPr>
+            <p:ph type="ftr" sz="quarter" idx="4"/>
+          </p:nvPr>
+        </p:nvSpPr>
+        <p:spPr>
+          <a:xfrm>
+            <a:off x="0" y="8685213"/>
+            <a:ext cx="2971800" cy="458787"/>
+          </a:xfrm>
+          <a:prstGeom prst="rect">
+            <a:avLst/>
+          </a:prstGeom>
+        </p:spPr>
+        <p:txBody>
+          <a:bodyPr vert="horz" lIns="91440" tIns="45720" rIns="91440" bIns="45720" rtlCol="0" anchor="b"/>
+          <a:lstStyle>
+            <a:lvl1pPr algn="l">
+              <a:defRPr sz="1200"/>
+            </a:lvl1pPr>
+          </a:lstStyle>
+          <a:p>
+            <a:endParaRPr lang="pt-BR"/>
+          </a:p>
+        </p:txBody>
+      </p:sp>
+      <p:sp>
+        <p:nvSpPr>
+          <p:cNvPr id="7" name="Slide Number Placeholder 6"/>
+          <p:cNvSpPr>
+            <a:spLocks noGrp="1"/>
+          </p:cNvSpPr>
+          <p:nvPr>
+            <p:ph type="sldNum" sz="quarter" idx="5"/>
+          </p:nvPr>
+        </p:nvSpPr>
+        <p:spPr>
+          <a:xfrm>
+            <a:off x="3884613" y="8685213"/>
+            <a:ext cx="2971800" cy="458787"/>
+          </a:xfrm>
+          <a:prstGeom prst="rect">
+            <a:avLst/>
+          </a:prstGeom>
+        </p:spPr>
+        <p:txBody>
+          <a:bodyPr vert="horz" lIns="91440" tIns="45720" rIns="91440" bIns="45720" rtlCol="0" anchor="b"/>
+          <a:lstStyle>
+            <a:lvl1pPr algn="r">
+              <a:defRPr sz="1200"/>
+            </a:lvl1pPr>
+          </a:lstStyle>
+          <a:p>
+            <a:fld id="{E2E252AF-49A8-4B9A-876F-BED144F54CD8}" type="slidenum">
+              <a:rPr lang="pt-BR" smtClean="0"/>
+              <a:t>‹#›</a:t>
+            </a:fld>
+            <a:endParaRPr lang="pt-BR"/>
+          </a:p>
+        </p:txBody>
+      </p:sp>
+    </p:spTree>
+    <p:extLst>
+      <p:ext uri="{BB962C8B-B14F-4D97-AF65-F5344CB8AC3E}">
+        <p14:creationId xmlns:p14="http://schemas.microsoft.com/office/powerpoint/2010/main" val="2972766443"/>
+      </p:ext>
+    </p:extLst>
+  </p:cSld>
+  <p:clrMap bg1="lt1" tx1="dk1" bg2="lt2" tx2="dk2" accent1="accent1" accent2="accent2" accent3="accent3" accent4="accent4" accent5="accent5" accent6="accent6" hlink="hlink" folHlink="folHlink"/>
+  <p:notesStyle>
+    <a:lvl1pPr marL="0" algn="l" defTabSz="914400" rtl="0" eaLnBrk="1" latinLnBrk="0" hangingPunct="1">
+      <a:defRPr sz="1200" kern="1200">
+        <a:solidFill>
+          <a:schemeClr val="tx1"/>
+        </a:solidFill>
+        <a:latin typeface="+mn-lt"/>
+        <a:ea typeface="+mn-ea"/>
+        <a:cs typeface="+mn-cs"/>
+      </a:defRPr>
+    </a:lvl1pPr>
+    <a:lvl2pPr marL="457200" algn="l" defTabSz="914400" rtl="0" eaLnBrk="1" latinLnBrk="0" hangingPunct="1">
+      <a:defRPr sz="1200" kern="1200">
+        <a:solidFill>
+          <a:schemeClr val="tx1"/>
+        </a:solidFill>
+        <a:latin typeface="+mn-lt"/>
+        <a:ea typeface="+mn-ea"/>
+        <a:cs typeface="+mn-cs"/>
+      </a:defRPr>
+    </a:lvl2pPr>
+    <a:lvl3pPr marL="914400" algn="l" defTabSz="914400" rtl="0" eaLnBrk="1" latinLnBrk="0" hangingPunct="1">
+      <a:defRPr sz="1200" kern="1200">
+        <a:solidFill>
+          <a:schemeClr val="tx1"/>
+        </a:solidFill>
+        <a:latin typeface="+mn-lt"/>
+        <a:ea typeface="+mn-ea"/>
+        <a:cs typeface="+mn-cs"/>
+      </a:defRPr>
+    </a:lvl3pPr>
+    <a:lvl4pPr marL="1371600" algn="l" defTabSz="914400" rtl="0" eaLnBrk="1" latinLnBrk="0" hangingPunct="1">
+      <a:defRPr sz="1200" kern="1200">
+        <a:solidFill>
+          <a:schemeClr val="tx1"/>
+        </a:solidFill>
+        <a:latin typeface="+mn-lt"/>
+        <a:ea typeface="+mn-ea"/>
+        <a:cs typeface="+mn-cs"/>
+      </a:defRPr>
+    </a:lvl4pPr>
+    <a:lvl5pPr marL="1828800" algn="l" defTabSz="914400" rtl="0" eaLnBrk="1" latinLnBrk="0" hangingPunct="1">
+      <a:defRPr sz="1200" kern="1200">
+        <a:solidFill>
+          <a:schemeClr val="tx1"/>
+        </a:solidFill>
+        <a:latin typeface="+mn-lt"/>
+        <a:ea typeface="+mn-ea"/>
+        <a:cs typeface="+mn-cs"/>
+      </a:defRPr>
+    </a:lvl5pPr>
+    <a:lvl6pPr marL="2286000" algn="l" defTabSz="914400" rtl="0" eaLnBrk="1" latinLnBrk="0" hangingPunct="1">
+      <a:defRPr sz="1200" kern="1200">
+        <a:solidFill>
+          <a:schemeClr val="tx1"/>
+        </a:solidFill>
+        <a:latin typeface="+mn-lt"/>
+        <a:ea typeface="+mn-ea"/>
+        <a:cs typeface="+mn-cs"/>
+      </a:defRPr>
+    </a:lvl6pPr>
+    <a:lvl7pPr marL="2743200" algn="l" defTabSz="914400" rtl="0" eaLnBrk="1" latinLnBrk="0" hangingPunct="1">
+      <a:defRPr sz="1200" kern="1200">
+        <a:solidFill>
+          <a:schemeClr val="tx1"/>
+        </a:solidFill>
+        <a:latin typeface="+mn-lt"/>
+        <a:ea typeface="+mn-ea"/>
+        <a:cs typeface="+mn-cs"/>
+      </a:defRPr>
+    </a:lvl7pPr>
+    <a:lvl8pPr marL="3200400" algn="l" defTabSz="914400" rtl="0" eaLnBrk="1" latinLnBrk="0" hangingPunct="1">
+      <a:defRPr sz="1200" kern="1200">
+        <a:solidFill>
+          <a:schemeClr val="tx1"/>
+        </a:solidFill>
+        <a:latin typeface="+mn-lt"/>
+        <a:ea typeface="+mn-ea"/>
+        <a:cs typeface="+mn-cs"/>
+      </a:defRPr>
+    </a:lvl8pPr>
+    <a:lvl9pPr marL="3657600" algn="l" defTabSz="914400" rtl="0" eaLnBrk="1" latinLnBrk="0" hangingPunct="1">
+      <a:defRPr sz="1200" kern="1200">
+        <a:solidFill>
+          <a:schemeClr val="tx1"/>
+        </a:solidFill>
+        <a:latin typeface="+mn-lt"/>
+        <a:ea typeface="+mn-ea"/>
+        <a:cs typeface="+mn-cs"/>
+      </a:defRPr>
+    </a:lvl9pPr>
+  </p:notesStyle>
+</p:notesMaster>
+</file>
+
+<file path=ppt/notesSlides/notesSlide1.xml><?xml version="1.0" encoding="utf-8"?>
+<p:notes xmlns:a="http://schemas.openxmlformats.org/drawingml/2006/main" xmlns:r="http://schemas.openxmlformats.org/officeDocument/2006/relationships" xmlns:p="http://schemas.openxmlformats.org/presentationml/2006/main">
+  <p:cSld>
+    <p:spTree>
+      <p:nvGrpSpPr>
+        <p:cNvPr id="1" name=""/>
+        <p:cNvGrpSpPr/>
+        <p:nvPr/>
+      </p:nvGrpSpPr>
+      <p:grpSpPr>
+        <a:xfrm>
+          <a:off x="0" y="0"/>
+          <a:ext cx="0" cy="0"/>
+          <a:chOff x="0" y="0"/>
+          <a:chExt cx="0" cy="0"/>
+        </a:xfrm>
+      </p:grpSpPr>
+      <p:sp>
+        <p:nvSpPr>
+          <p:cNvPr id="2" name="Slide Image Placeholder 1"/>
+          <p:cNvSpPr>
+            <a:spLocks noGrp="1" noRot="1" noChangeAspect="1"/>
+          </p:cNvSpPr>
+          <p:nvPr>
+            <p:ph type="sldImg"/>
+          </p:nvPr>
+        </p:nvSpPr>
+        <p:spPr/>
+      </p:sp>
+      <p:sp>
+        <p:nvSpPr>
+          <p:cNvPr id="3" name="Notes Placeholder 2"/>
+          <p:cNvSpPr>
+            <a:spLocks noGrp="1"/>
+          </p:cNvSpPr>
+          <p:nvPr>
+            <p:ph type="body" idx="1"/>
+          </p:nvPr>
+        </p:nvSpPr>
+        <p:spPr/>
+        <p:txBody>
+          <a:bodyPr/>
+          <a:lstStyle/>
+          <a:p>
+            <a:pPr marL="0" marR="0" lvl="0" indent="0" algn="l" defTabSz="914400" rtl="0" eaLnBrk="1" fontAlgn="auto" latinLnBrk="0" hangingPunct="1">
+              <a:lnSpc>
+                <a:spcPct val="100000"/>
+              </a:lnSpc>
+              <a:spcBef>
+                <a:spcPts val="0"/>
+              </a:spcBef>
+              <a:spcAft>
+                <a:spcPts val="0"/>
+              </a:spcAft>
+              <a:buClrTx/>
+              <a:buSzTx/>
+              <a:buFontTx/>
+              <a:buNone/>
+              <a:tabLst/>
+              <a:defRPr/>
+            </a:pPr>
+            <a:r>
+              <a:rPr lang="pt-BR" dirty="0" smtClean="0"/>
+              <a:t>Colocar um sumário da apresentação</a:t>
+            </a:r>
+            <a:br>
+              <a:rPr lang="pt-BR" dirty="0" smtClean="0"/>
+            </a:br>
+            <a:r>
+              <a:rPr lang="pt-BR" dirty="0" smtClean="0"/>
+              <a:t>Tempo estimado – 1 minuto</a:t>
+            </a:r>
+          </a:p>
+          <a:p>
+            <a:endParaRPr lang="pt-BR" dirty="0"/>
+          </a:p>
+        </p:txBody>
+      </p:sp>
+      <p:sp>
+        <p:nvSpPr>
+          <p:cNvPr id="4" name="Slide Number Placeholder 3"/>
+          <p:cNvSpPr>
+            <a:spLocks noGrp="1"/>
+          </p:cNvSpPr>
+          <p:nvPr>
+            <p:ph type="sldNum" sz="quarter" idx="10"/>
+          </p:nvPr>
+        </p:nvSpPr>
+        <p:spPr/>
+        <p:txBody>
+          <a:bodyPr/>
+          <a:lstStyle/>
+          <a:p>
+            <a:fld id="{E2E252AF-49A8-4B9A-876F-BED144F54CD8}" type="slidenum">
+              <a:rPr lang="pt-BR" smtClean="0"/>
+              <a:t>2</a:t>
+            </a:fld>
+            <a:endParaRPr lang="pt-BR"/>
+          </a:p>
+        </p:txBody>
+      </p:sp>
+    </p:spTree>
+    <p:extLst>
+      <p:ext uri="{BB962C8B-B14F-4D97-AF65-F5344CB8AC3E}">
+        <p14:creationId xmlns:p14="http://schemas.microsoft.com/office/powerpoint/2010/main" val="3900145442"/>
+      </p:ext>
+    </p:extLst>
+  </p:cSld>
+  <p:clrMapOvr>
+    <a:masterClrMapping/>
+  </p:clrMapOvr>
+</p:notes>
+</file>
+
+<file path=ppt/notesSlides/notesSlide10.xml><?xml version="1.0" encoding="utf-8"?>
+<p:notes xmlns:a="http://schemas.openxmlformats.org/drawingml/2006/main" xmlns:r="http://schemas.openxmlformats.org/officeDocument/2006/relationships" xmlns:p="http://schemas.openxmlformats.org/presentationml/2006/main">
+  <p:cSld>
+    <p:spTree>
+      <p:nvGrpSpPr>
+        <p:cNvPr id="1" name=""/>
+        <p:cNvGrpSpPr/>
+        <p:nvPr/>
+      </p:nvGrpSpPr>
+      <p:grpSpPr>
+        <a:xfrm>
+          <a:off x="0" y="0"/>
+          <a:ext cx="0" cy="0"/>
+          <a:chOff x="0" y="0"/>
+          <a:chExt cx="0" cy="0"/>
+        </a:xfrm>
+      </p:grpSpPr>
+      <p:sp>
+        <p:nvSpPr>
+          <p:cNvPr id="2" name="Slide Image Placeholder 1"/>
+          <p:cNvSpPr>
+            <a:spLocks noGrp="1" noRot="1" noChangeAspect="1"/>
+          </p:cNvSpPr>
+          <p:nvPr>
+            <p:ph type="sldImg"/>
+          </p:nvPr>
+        </p:nvSpPr>
+        <p:spPr/>
+      </p:sp>
+      <p:sp>
+        <p:nvSpPr>
+          <p:cNvPr id="3" name="Notes Placeholder 2"/>
+          <p:cNvSpPr>
+            <a:spLocks noGrp="1"/>
+          </p:cNvSpPr>
+          <p:nvPr>
+            <p:ph type="body" idx="1"/>
+          </p:nvPr>
+        </p:nvSpPr>
+        <p:spPr/>
+        <p:txBody>
+          <a:bodyPr/>
+          <a:lstStyle/>
+          <a:p>
+            <a:r>
+              <a:rPr lang="pt-BR" dirty="0" smtClean="0"/>
+              <a:t>Apresentar os principais diagramas desenvolvidos na especificação e que permitem compreender os elementos essenciais do trabalho</a:t>
+            </a:r>
+          </a:p>
+          <a:p>
+            <a:r>
+              <a:rPr lang="pt-BR" dirty="0" smtClean="0"/>
+              <a:t>Tempo estimado – 8 minutos</a:t>
+            </a:r>
+          </a:p>
+          <a:p>
+            <a:endParaRPr lang="pt-BR" dirty="0" smtClean="0"/>
+          </a:p>
+          <a:p>
+            <a:endParaRPr lang="pt-BR" dirty="0"/>
+          </a:p>
+        </p:txBody>
+      </p:sp>
+      <p:sp>
+        <p:nvSpPr>
+          <p:cNvPr id="4" name="Slide Number Placeholder 3"/>
+          <p:cNvSpPr>
+            <a:spLocks noGrp="1"/>
+          </p:cNvSpPr>
+          <p:nvPr>
+            <p:ph type="sldNum" sz="quarter" idx="10"/>
+          </p:nvPr>
+        </p:nvSpPr>
+        <p:spPr/>
+        <p:txBody>
+          <a:bodyPr/>
+          <a:lstStyle/>
+          <a:p>
+            <a:fld id="{E2E252AF-49A8-4B9A-876F-BED144F54CD8}" type="slidenum">
+              <a:rPr lang="pt-BR" smtClean="0"/>
+              <a:t>12</a:t>
+            </a:fld>
+            <a:endParaRPr lang="pt-BR"/>
+          </a:p>
+        </p:txBody>
+      </p:sp>
+    </p:spTree>
+    <p:extLst>
+      <p:ext uri="{BB962C8B-B14F-4D97-AF65-F5344CB8AC3E}">
+        <p14:creationId xmlns:p14="http://schemas.microsoft.com/office/powerpoint/2010/main" val="2766108740"/>
+      </p:ext>
+    </p:extLst>
+  </p:cSld>
+  <p:clrMapOvr>
+    <a:masterClrMapping/>
+  </p:clrMapOvr>
+</p:notes>
+</file>
+
+<file path=ppt/notesSlides/notesSlide11.xml><?xml version="1.0" encoding="utf-8"?>
+<p:notes xmlns:a="http://schemas.openxmlformats.org/drawingml/2006/main" xmlns:r="http://schemas.openxmlformats.org/officeDocument/2006/relationships" xmlns:p="http://schemas.openxmlformats.org/presentationml/2006/main">
+  <p:cSld>
+    <p:spTree>
+      <p:nvGrpSpPr>
+        <p:cNvPr id="1" name=""/>
+        <p:cNvGrpSpPr/>
+        <p:nvPr/>
+      </p:nvGrpSpPr>
+      <p:grpSpPr>
+        <a:xfrm>
+          <a:off x="0" y="0"/>
+          <a:ext cx="0" cy="0"/>
+          <a:chOff x="0" y="0"/>
+          <a:chExt cx="0" cy="0"/>
+        </a:xfrm>
+      </p:grpSpPr>
+      <p:sp>
+        <p:nvSpPr>
+          <p:cNvPr id="2" name="Slide Image Placeholder 1"/>
+          <p:cNvSpPr>
+            <a:spLocks noGrp="1" noRot="1" noChangeAspect="1"/>
+          </p:cNvSpPr>
+          <p:nvPr>
+            <p:ph type="sldImg"/>
+          </p:nvPr>
+        </p:nvSpPr>
+        <p:spPr/>
+      </p:sp>
+      <p:sp>
+        <p:nvSpPr>
+          <p:cNvPr id="3" name="Notes Placeholder 2"/>
+          <p:cNvSpPr>
+            <a:spLocks noGrp="1"/>
+          </p:cNvSpPr>
+          <p:nvPr>
+            <p:ph type="body" idx="1"/>
+          </p:nvPr>
+        </p:nvSpPr>
+        <p:spPr/>
+        <p:txBody>
+          <a:bodyPr/>
+          <a:lstStyle/>
+          <a:p>
+            <a:r>
+              <a:rPr lang="pt-BR" dirty="0" smtClean="0"/>
+              <a:t>(Apresentar algumas (poucas) telas do software – quando houver. Lembre-se que você irá apresentar o software em funcionamento)</a:t>
+            </a:r>
+          </a:p>
+          <a:p>
+            <a:r>
+              <a:rPr lang="pt-BR" dirty="0" smtClean="0"/>
+              <a:t>(Tempo estimado – 1 minuto)</a:t>
+            </a:r>
+          </a:p>
+          <a:p>
+            <a:endParaRPr lang="pt-BR" dirty="0" smtClean="0"/>
+          </a:p>
+          <a:p>
+            <a:endParaRPr lang="pt-BR" dirty="0"/>
+          </a:p>
+        </p:txBody>
+      </p:sp>
+      <p:sp>
+        <p:nvSpPr>
+          <p:cNvPr id="4" name="Slide Number Placeholder 3"/>
+          <p:cNvSpPr>
+            <a:spLocks noGrp="1"/>
+          </p:cNvSpPr>
+          <p:nvPr>
+            <p:ph type="sldNum" sz="quarter" idx="10"/>
+          </p:nvPr>
+        </p:nvSpPr>
+        <p:spPr/>
+        <p:txBody>
+          <a:bodyPr/>
+          <a:lstStyle/>
+          <a:p>
+            <a:fld id="{E2E252AF-49A8-4B9A-876F-BED144F54CD8}" type="slidenum">
+              <a:rPr lang="pt-BR" smtClean="0"/>
+              <a:t>15</a:t>
+            </a:fld>
+            <a:endParaRPr lang="pt-BR"/>
+          </a:p>
+        </p:txBody>
+      </p:sp>
+    </p:spTree>
+    <p:extLst>
+      <p:ext uri="{BB962C8B-B14F-4D97-AF65-F5344CB8AC3E}">
+        <p14:creationId xmlns:p14="http://schemas.microsoft.com/office/powerpoint/2010/main" val="1157560533"/>
+      </p:ext>
+    </p:extLst>
+  </p:cSld>
+  <p:clrMapOvr>
+    <a:masterClrMapping/>
+  </p:clrMapOvr>
+</p:notes>
+</file>
+
+<file path=ppt/notesSlides/notesSlide2.xml><?xml version="1.0" encoding="utf-8"?>
+<p:notes xmlns:a="http://schemas.openxmlformats.org/drawingml/2006/main" xmlns:r="http://schemas.openxmlformats.org/officeDocument/2006/relationships" xmlns:p="http://schemas.openxmlformats.org/presentationml/2006/main">
+  <p:cSld>
+    <p:spTree>
+      <p:nvGrpSpPr>
+        <p:cNvPr id="1" name=""/>
+        <p:cNvGrpSpPr/>
+        <p:nvPr/>
+      </p:nvGrpSpPr>
+      <p:grpSpPr>
+        <a:xfrm>
+          <a:off x="0" y="0"/>
+          <a:ext cx="0" cy="0"/>
+          <a:chOff x="0" y="0"/>
+          <a:chExt cx="0" cy="0"/>
+        </a:xfrm>
+      </p:grpSpPr>
+      <p:sp>
+        <p:nvSpPr>
+          <p:cNvPr id="2" name="Slide Image Placeholder 1"/>
+          <p:cNvSpPr>
+            <a:spLocks noGrp="1" noRot="1" noChangeAspect="1"/>
+          </p:cNvSpPr>
+          <p:nvPr>
+            <p:ph type="sldImg"/>
+          </p:nvPr>
+        </p:nvSpPr>
+        <p:spPr/>
+      </p:sp>
+      <p:sp>
+        <p:nvSpPr>
+          <p:cNvPr id="3" name="Notes Placeholder 2"/>
+          <p:cNvSpPr>
+            <a:spLocks noGrp="1"/>
+          </p:cNvSpPr>
+          <p:nvPr>
+            <p:ph type="body" idx="1"/>
+          </p:nvPr>
+        </p:nvSpPr>
+        <p:spPr/>
+        <p:txBody>
+          <a:bodyPr/>
+          <a:lstStyle/>
+          <a:p>
+            <a:r>
+              <a:rPr lang="pt-BR" dirty="0" smtClean="0"/>
+              <a:t>Contextualizar o trabalho – Como ele surgiu? Por que é importante?</a:t>
+            </a:r>
+          </a:p>
+          <a:p>
+            <a:r>
+              <a:rPr lang="pt-BR" dirty="0" smtClean="0"/>
+              <a:t>Tempo estimado – 2 minutos</a:t>
+            </a:r>
+          </a:p>
+          <a:p>
+            <a:endParaRPr lang="pt-BR" dirty="0" smtClean="0"/>
+          </a:p>
+          <a:p>
+            <a:endParaRPr lang="pt-BR" dirty="0" smtClean="0"/>
+          </a:p>
+          <a:p>
+            <a:endParaRPr lang="pt-BR" dirty="0"/>
+          </a:p>
+        </p:txBody>
+      </p:sp>
+      <p:sp>
+        <p:nvSpPr>
+          <p:cNvPr id="4" name="Slide Number Placeholder 3"/>
+          <p:cNvSpPr>
+            <a:spLocks noGrp="1"/>
+          </p:cNvSpPr>
+          <p:nvPr>
+            <p:ph type="sldNum" sz="quarter" idx="10"/>
+          </p:nvPr>
+        </p:nvSpPr>
+        <p:spPr/>
+        <p:txBody>
+          <a:bodyPr/>
+          <a:lstStyle/>
+          <a:p>
+            <a:fld id="{E2E252AF-49A8-4B9A-876F-BED144F54CD8}" type="slidenum">
+              <a:rPr lang="pt-BR" smtClean="0"/>
+              <a:t>3</a:t>
+            </a:fld>
+            <a:endParaRPr lang="pt-BR"/>
+          </a:p>
+        </p:txBody>
+      </p:sp>
+    </p:spTree>
+    <p:extLst>
+      <p:ext uri="{BB962C8B-B14F-4D97-AF65-F5344CB8AC3E}">
+        <p14:creationId xmlns:p14="http://schemas.microsoft.com/office/powerpoint/2010/main" val="1782546837"/>
+      </p:ext>
+    </p:extLst>
+  </p:cSld>
+  <p:clrMapOvr>
+    <a:masterClrMapping/>
+  </p:clrMapOvr>
+</p:notes>
+</file>
+
+<file path=ppt/notesSlides/notesSlide3.xml><?xml version="1.0" encoding="utf-8"?>
+<p:notes xmlns:a="http://schemas.openxmlformats.org/drawingml/2006/main" xmlns:r="http://schemas.openxmlformats.org/officeDocument/2006/relationships" xmlns:p="http://schemas.openxmlformats.org/presentationml/2006/main">
+  <p:cSld>
+    <p:spTree>
+      <p:nvGrpSpPr>
+        <p:cNvPr id="1" name=""/>
+        <p:cNvGrpSpPr/>
+        <p:nvPr/>
+      </p:nvGrpSpPr>
+      <p:grpSpPr>
+        <a:xfrm>
+          <a:off x="0" y="0"/>
+          <a:ext cx="0" cy="0"/>
+          <a:chOff x="0" y="0"/>
+          <a:chExt cx="0" cy="0"/>
+        </a:xfrm>
+      </p:grpSpPr>
+      <p:sp>
+        <p:nvSpPr>
+          <p:cNvPr id="2" name="Slide Image Placeholder 1"/>
+          <p:cNvSpPr>
+            <a:spLocks noGrp="1" noRot="1" noChangeAspect="1"/>
+          </p:cNvSpPr>
+          <p:nvPr>
+            <p:ph type="sldImg"/>
+          </p:nvPr>
+        </p:nvSpPr>
+        <p:spPr/>
+      </p:sp>
+      <p:sp>
+        <p:nvSpPr>
+          <p:cNvPr id="3" name="Notes Placeholder 2"/>
+          <p:cNvSpPr>
+            <a:spLocks noGrp="1"/>
+          </p:cNvSpPr>
+          <p:nvPr>
+            <p:ph type="body" idx="1"/>
+          </p:nvPr>
+        </p:nvSpPr>
+        <p:spPr/>
+        <p:txBody>
+          <a:bodyPr/>
+          <a:lstStyle/>
+          <a:p>
+            <a:r>
+              <a:rPr lang="pt-BR" dirty="0" smtClean="0"/>
+              <a:t>Objetivo geral e específicos – cuidado para as letras não ficarem pequenas. Tamanho mínimo recomendado: 18</a:t>
+            </a:r>
+          </a:p>
+          <a:p>
+            <a:r>
+              <a:rPr lang="pt-BR" dirty="0" smtClean="0"/>
+              <a:t>Tempo estimado – 1 minuto</a:t>
+            </a:r>
+          </a:p>
+        </p:txBody>
+      </p:sp>
+      <p:sp>
+        <p:nvSpPr>
+          <p:cNvPr id="4" name="Slide Number Placeholder 3"/>
+          <p:cNvSpPr>
+            <a:spLocks noGrp="1"/>
+          </p:cNvSpPr>
+          <p:nvPr>
+            <p:ph type="sldNum" sz="quarter" idx="10"/>
+          </p:nvPr>
+        </p:nvSpPr>
+        <p:spPr/>
+        <p:txBody>
+          <a:bodyPr/>
+          <a:lstStyle/>
+          <a:p>
+            <a:fld id="{E2E252AF-49A8-4B9A-876F-BED144F54CD8}" type="slidenum">
+              <a:rPr lang="pt-BR" smtClean="0"/>
+              <a:t>4</a:t>
+            </a:fld>
+            <a:endParaRPr lang="pt-BR"/>
+          </a:p>
+        </p:txBody>
+      </p:sp>
+    </p:spTree>
+    <p:extLst>
+      <p:ext uri="{BB962C8B-B14F-4D97-AF65-F5344CB8AC3E}">
+        <p14:creationId xmlns:p14="http://schemas.microsoft.com/office/powerpoint/2010/main" val="1251715442"/>
+      </p:ext>
+    </p:extLst>
+  </p:cSld>
+  <p:clrMapOvr>
+    <a:masterClrMapping/>
+  </p:clrMapOvr>
+</p:notes>
+</file>
+
+<file path=ppt/notesSlides/notesSlide4.xml><?xml version="1.0" encoding="utf-8"?>
+<p:notes xmlns:a="http://schemas.openxmlformats.org/drawingml/2006/main" xmlns:r="http://schemas.openxmlformats.org/officeDocument/2006/relationships" xmlns:p="http://schemas.openxmlformats.org/presentationml/2006/main">
+  <p:cSld>
+    <p:spTree>
+      <p:nvGrpSpPr>
+        <p:cNvPr id="1" name=""/>
+        <p:cNvGrpSpPr/>
+        <p:nvPr/>
+      </p:nvGrpSpPr>
+      <p:grpSpPr>
+        <a:xfrm>
+          <a:off x="0" y="0"/>
+          <a:ext cx="0" cy="0"/>
+          <a:chOff x="0" y="0"/>
+          <a:chExt cx="0" cy="0"/>
+        </a:xfrm>
+      </p:grpSpPr>
+      <p:sp>
+        <p:nvSpPr>
+          <p:cNvPr id="2" name="Slide Image Placeholder 1"/>
+          <p:cNvSpPr>
+            <a:spLocks noGrp="1" noRot="1" noChangeAspect="1"/>
+          </p:cNvSpPr>
+          <p:nvPr>
+            <p:ph type="sldImg"/>
+          </p:nvPr>
+        </p:nvSpPr>
+        <p:spPr/>
+      </p:sp>
+      <p:sp>
+        <p:nvSpPr>
+          <p:cNvPr id="3" name="Notes Placeholder 2"/>
+          <p:cNvSpPr>
+            <a:spLocks noGrp="1"/>
+          </p:cNvSpPr>
+          <p:nvPr>
+            <p:ph type="body" idx="1"/>
+          </p:nvPr>
+        </p:nvSpPr>
+        <p:spPr/>
+        <p:txBody>
+          <a:bodyPr/>
+          <a:lstStyle/>
+          <a:p>
+            <a:r>
+              <a:rPr lang="pt-BR" dirty="0" smtClean="0"/>
+              <a:t>Focar nos conceitos, técnicas e ferramentas mais relevantes para a compreensão do trabalho</a:t>
+            </a:r>
+          </a:p>
+          <a:p>
+            <a:r>
+              <a:rPr lang="pt-BR" dirty="0" smtClean="0"/>
+              <a:t>Tempo estimado – 3 minutos</a:t>
+            </a:r>
+          </a:p>
+          <a:p>
+            <a:endParaRPr lang="pt-BR" dirty="0" smtClean="0"/>
+          </a:p>
+          <a:p>
+            <a:endParaRPr lang="pt-BR" dirty="0"/>
+          </a:p>
+        </p:txBody>
+      </p:sp>
+      <p:sp>
+        <p:nvSpPr>
+          <p:cNvPr id="4" name="Slide Number Placeholder 3"/>
+          <p:cNvSpPr>
+            <a:spLocks noGrp="1"/>
+          </p:cNvSpPr>
+          <p:nvPr>
+            <p:ph type="sldNum" sz="quarter" idx="10"/>
+          </p:nvPr>
+        </p:nvSpPr>
+        <p:spPr/>
+        <p:txBody>
+          <a:bodyPr/>
+          <a:lstStyle/>
+          <a:p>
+            <a:fld id="{E2E252AF-49A8-4B9A-876F-BED144F54CD8}" type="slidenum">
+              <a:rPr lang="pt-BR" smtClean="0"/>
+              <a:t>5</a:t>
+            </a:fld>
+            <a:endParaRPr lang="pt-BR"/>
+          </a:p>
+        </p:txBody>
+      </p:sp>
+    </p:spTree>
+    <p:extLst>
+      <p:ext uri="{BB962C8B-B14F-4D97-AF65-F5344CB8AC3E}">
+        <p14:creationId xmlns:p14="http://schemas.microsoft.com/office/powerpoint/2010/main" val="1056502546"/>
+      </p:ext>
+    </p:extLst>
+  </p:cSld>
+  <p:clrMapOvr>
+    <a:masterClrMapping/>
+  </p:clrMapOvr>
+</p:notes>
+</file>
+
+<file path=ppt/notesSlides/notesSlide5.xml><?xml version="1.0" encoding="utf-8"?>
+<p:notes xmlns:a="http://schemas.openxmlformats.org/drawingml/2006/main" xmlns:r="http://schemas.openxmlformats.org/officeDocument/2006/relationships" xmlns:p="http://schemas.openxmlformats.org/presentationml/2006/main">
+  <p:cSld>
+    <p:spTree>
+      <p:nvGrpSpPr>
+        <p:cNvPr id="1" name=""/>
+        <p:cNvGrpSpPr/>
+        <p:nvPr/>
+      </p:nvGrpSpPr>
+      <p:grpSpPr>
+        <a:xfrm>
+          <a:off x="0" y="0"/>
+          <a:ext cx="0" cy="0"/>
+          <a:chOff x="0" y="0"/>
+          <a:chExt cx="0" cy="0"/>
+        </a:xfrm>
+      </p:grpSpPr>
+      <p:sp>
+        <p:nvSpPr>
+          <p:cNvPr id="2" name="Slide Image Placeholder 1"/>
+          <p:cNvSpPr>
+            <a:spLocks noGrp="1" noRot="1" noChangeAspect="1"/>
+          </p:cNvSpPr>
+          <p:nvPr>
+            <p:ph type="sldImg"/>
+          </p:nvPr>
+        </p:nvSpPr>
+        <p:spPr/>
+      </p:sp>
+      <p:sp>
+        <p:nvSpPr>
+          <p:cNvPr id="3" name="Notes Placeholder 2"/>
+          <p:cNvSpPr>
+            <a:spLocks noGrp="1"/>
+          </p:cNvSpPr>
+          <p:nvPr>
+            <p:ph type="body" idx="1"/>
+          </p:nvPr>
+        </p:nvSpPr>
+        <p:spPr/>
+        <p:txBody>
+          <a:bodyPr/>
+          <a:lstStyle/>
+          <a:p>
+            <a:r>
+              <a:rPr lang="pt-BR" dirty="0" smtClean="0"/>
+              <a:t>Focar nos conceitos, técnicas e ferramentas mais relevantes para a compreensão do trabalho</a:t>
+            </a:r>
+          </a:p>
+          <a:p>
+            <a:r>
+              <a:rPr lang="pt-BR" dirty="0" smtClean="0"/>
+              <a:t>Tempo estimado – 3 minutos</a:t>
+            </a:r>
+          </a:p>
+          <a:p>
+            <a:endParaRPr lang="pt-BR" dirty="0" smtClean="0"/>
+          </a:p>
+          <a:p>
+            <a:endParaRPr lang="pt-BR" dirty="0"/>
+          </a:p>
+        </p:txBody>
+      </p:sp>
+      <p:sp>
+        <p:nvSpPr>
+          <p:cNvPr id="4" name="Slide Number Placeholder 3"/>
+          <p:cNvSpPr>
+            <a:spLocks noGrp="1"/>
+          </p:cNvSpPr>
+          <p:nvPr>
+            <p:ph type="sldNum" sz="quarter" idx="10"/>
+          </p:nvPr>
+        </p:nvSpPr>
+        <p:spPr/>
+        <p:txBody>
+          <a:bodyPr/>
+          <a:lstStyle/>
+          <a:p>
+            <a:fld id="{E2E252AF-49A8-4B9A-876F-BED144F54CD8}" type="slidenum">
+              <a:rPr lang="pt-BR" smtClean="0"/>
+              <a:t>6</a:t>
+            </a:fld>
+            <a:endParaRPr lang="pt-BR"/>
+          </a:p>
+        </p:txBody>
+      </p:sp>
+    </p:spTree>
+    <p:extLst>
+      <p:ext uri="{BB962C8B-B14F-4D97-AF65-F5344CB8AC3E}">
+        <p14:creationId xmlns:p14="http://schemas.microsoft.com/office/powerpoint/2010/main" val="2019739321"/>
+      </p:ext>
+    </p:extLst>
+  </p:cSld>
+  <p:clrMapOvr>
+    <a:masterClrMapping/>
+  </p:clrMapOvr>
+</p:notes>
+</file>
+
+<file path=ppt/notesSlides/notesSlide6.xml><?xml version="1.0" encoding="utf-8"?>
+<p:notes xmlns:a="http://schemas.openxmlformats.org/drawingml/2006/main" xmlns:r="http://schemas.openxmlformats.org/officeDocument/2006/relationships" xmlns:p="http://schemas.openxmlformats.org/presentationml/2006/main">
+  <p:cSld>
+    <p:spTree>
+      <p:nvGrpSpPr>
+        <p:cNvPr id="1" name=""/>
+        <p:cNvGrpSpPr/>
+        <p:nvPr/>
+      </p:nvGrpSpPr>
+      <p:grpSpPr>
+        <a:xfrm>
+          <a:off x="0" y="0"/>
+          <a:ext cx="0" cy="0"/>
+          <a:chOff x="0" y="0"/>
+          <a:chExt cx="0" cy="0"/>
+        </a:xfrm>
+      </p:grpSpPr>
+      <p:sp>
+        <p:nvSpPr>
+          <p:cNvPr id="2" name="Slide Image Placeholder 1"/>
+          <p:cNvSpPr>
+            <a:spLocks noGrp="1" noRot="1" noChangeAspect="1"/>
+          </p:cNvSpPr>
+          <p:nvPr>
+            <p:ph type="sldImg"/>
+          </p:nvPr>
+        </p:nvSpPr>
+        <p:spPr/>
+      </p:sp>
+      <p:sp>
+        <p:nvSpPr>
+          <p:cNvPr id="3" name="Notes Placeholder 2"/>
+          <p:cNvSpPr>
+            <a:spLocks noGrp="1"/>
+          </p:cNvSpPr>
+          <p:nvPr>
+            <p:ph type="body" idx="1"/>
+          </p:nvPr>
+        </p:nvSpPr>
+        <p:spPr/>
+        <p:txBody>
+          <a:bodyPr/>
+          <a:lstStyle/>
+          <a:p>
+            <a:r>
+              <a:rPr lang="pt-BR" dirty="0" smtClean="0"/>
+              <a:t>Focar nos conceitos, técnicas e ferramentas mais relevantes para a compreensão do trabalho</a:t>
+            </a:r>
+          </a:p>
+          <a:p>
+            <a:r>
+              <a:rPr lang="pt-BR" dirty="0" smtClean="0"/>
+              <a:t>Tempo estimado – 3 minutos</a:t>
+            </a:r>
+          </a:p>
+          <a:p>
+            <a:endParaRPr lang="pt-BR" dirty="0" smtClean="0"/>
+          </a:p>
+          <a:p>
+            <a:endParaRPr lang="pt-BR" dirty="0"/>
+          </a:p>
+        </p:txBody>
+      </p:sp>
+      <p:sp>
+        <p:nvSpPr>
+          <p:cNvPr id="4" name="Slide Number Placeholder 3"/>
+          <p:cNvSpPr>
+            <a:spLocks noGrp="1"/>
+          </p:cNvSpPr>
+          <p:nvPr>
+            <p:ph type="sldNum" sz="quarter" idx="10"/>
+          </p:nvPr>
+        </p:nvSpPr>
+        <p:spPr/>
+        <p:txBody>
+          <a:bodyPr/>
+          <a:lstStyle/>
+          <a:p>
+            <a:fld id="{E2E252AF-49A8-4B9A-876F-BED144F54CD8}" type="slidenum">
+              <a:rPr lang="pt-BR" smtClean="0"/>
+              <a:t>7</a:t>
+            </a:fld>
+            <a:endParaRPr lang="pt-BR"/>
+          </a:p>
+        </p:txBody>
+      </p:sp>
+    </p:spTree>
+    <p:extLst>
+      <p:ext uri="{BB962C8B-B14F-4D97-AF65-F5344CB8AC3E}">
+        <p14:creationId xmlns:p14="http://schemas.microsoft.com/office/powerpoint/2010/main" val="209106463"/>
+      </p:ext>
+    </p:extLst>
+  </p:cSld>
+  <p:clrMapOvr>
+    <a:masterClrMapping/>
+  </p:clrMapOvr>
+</p:notes>
+</file>
+
+<file path=ppt/notesSlides/notesSlide7.xml><?xml version="1.0" encoding="utf-8"?>
+<p:notes xmlns:a="http://schemas.openxmlformats.org/drawingml/2006/main" xmlns:r="http://schemas.openxmlformats.org/officeDocument/2006/relationships" xmlns:p="http://schemas.openxmlformats.org/presentationml/2006/main">
+  <p:cSld>
+    <p:spTree>
+      <p:nvGrpSpPr>
+        <p:cNvPr id="1" name=""/>
+        <p:cNvGrpSpPr/>
+        <p:nvPr/>
+      </p:nvGrpSpPr>
+      <p:grpSpPr>
+        <a:xfrm>
+          <a:off x="0" y="0"/>
+          <a:ext cx="0" cy="0"/>
+          <a:chOff x="0" y="0"/>
+          <a:chExt cx="0" cy="0"/>
+        </a:xfrm>
+      </p:grpSpPr>
+      <p:sp>
+        <p:nvSpPr>
+          <p:cNvPr id="2" name="Slide Image Placeholder 1"/>
+          <p:cNvSpPr>
+            <a:spLocks noGrp="1" noRot="1" noChangeAspect="1"/>
+          </p:cNvSpPr>
+          <p:nvPr>
+            <p:ph type="sldImg"/>
+          </p:nvPr>
+        </p:nvSpPr>
+        <p:spPr/>
+      </p:sp>
+      <p:sp>
+        <p:nvSpPr>
+          <p:cNvPr id="3" name="Notes Placeholder 2"/>
+          <p:cNvSpPr>
+            <a:spLocks noGrp="1"/>
+          </p:cNvSpPr>
+          <p:nvPr>
+            <p:ph type="body" idx="1"/>
+          </p:nvPr>
+        </p:nvSpPr>
+        <p:spPr/>
+        <p:txBody>
+          <a:bodyPr/>
+          <a:lstStyle/>
+          <a:p>
+            <a:r>
+              <a:rPr lang="pt-BR" dirty="0" smtClean="0"/>
+              <a:t>Focar nos conceitos, técnicas e ferramentas mais relevantes para a compreensão do trabalho</a:t>
+            </a:r>
+          </a:p>
+          <a:p>
+            <a:r>
+              <a:rPr lang="pt-BR" dirty="0" smtClean="0"/>
+              <a:t>Tempo estimado – 3 minutos</a:t>
+            </a:r>
+          </a:p>
+          <a:p>
+            <a:endParaRPr lang="pt-BR" dirty="0" smtClean="0"/>
+          </a:p>
+          <a:p>
+            <a:endParaRPr lang="pt-BR" dirty="0"/>
+          </a:p>
+        </p:txBody>
+      </p:sp>
+      <p:sp>
+        <p:nvSpPr>
+          <p:cNvPr id="4" name="Slide Number Placeholder 3"/>
+          <p:cNvSpPr>
+            <a:spLocks noGrp="1"/>
+          </p:cNvSpPr>
+          <p:nvPr>
+            <p:ph type="sldNum" sz="quarter" idx="10"/>
+          </p:nvPr>
+        </p:nvSpPr>
+        <p:spPr/>
+        <p:txBody>
+          <a:bodyPr/>
+          <a:lstStyle/>
+          <a:p>
+            <a:fld id="{E2E252AF-49A8-4B9A-876F-BED144F54CD8}" type="slidenum">
+              <a:rPr lang="pt-BR" smtClean="0"/>
+              <a:t>8</a:t>
+            </a:fld>
+            <a:endParaRPr lang="pt-BR"/>
+          </a:p>
+        </p:txBody>
+      </p:sp>
+    </p:spTree>
+    <p:extLst>
+      <p:ext uri="{BB962C8B-B14F-4D97-AF65-F5344CB8AC3E}">
+        <p14:creationId xmlns:p14="http://schemas.microsoft.com/office/powerpoint/2010/main" val="2712682795"/>
+      </p:ext>
+    </p:extLst>
+  </p:cSld>
+  <p:clrMapOvr>
+    <a:masterClrMapping/>
+  </p:clrMapOvr>
+</p:notes>
+</file>
+
+<file path=ppt/notesSlides/notesSlide8.xml><?xml version="1.0" encoding="utf-8"?>
+<p:notes xmlns:a="http://schemas.openxmlformats.org/drawingml/2006/main" xmlns:r="http://schemas.openxmlformats.org/officeDocument/2006/relationships" xmlns:p="http://schemas.openxmlformats.org/presentationml/2006/main">
+  <p:cSld>
+    <p:spTree>
+      <p:nvGrpSpPr>
+        <p:cNvPr id="1" name=""/>
+        <p:cNvGrpSpPr/>
+        <p:nvPr/>
+      </p:nvGrpSpPr>
+      <p:grpSpPr>
+        <a:xfrm>
+          <a:off x="0" y="0"/>
+          <a:ext cx="0" cy="0"/>
+          <a:chOff x="0" y="0"/>
+          <a:chExt cx="0" cy="0"/>
+        </a:xfrm>
+      </p:grpSpPr>
+      <p:sp>
+        <p:nvSpPr>
+          <p:cNvPr id="2" name="Slide Image Placeholder 1"/>
+          <p:cNvSpPr>
+            <a:spLocks noGrp="1" noRot="1" noChangeAspect="1"/>
+          </p:cNvSpPr>
+          <p:nvPr>
+            <p:ph type="sldImg"/>
+          </p:nvPr>
+        </p:nvSpPr>
+        <p:spPr/>
+      </p:sp>
+      <p:sp>
+        <p:nvSpPr>
+          <p:cNvPr id="3" name="Notes Placeholder 2"/>
+          <p:cNvSpPr>
+            <a:spLocks noGrp="1"/>
+          </p:cNvSpPr>
+          <p:nvPr>
+            <p:ph type="body" idx="1"/>
+          </p:nvPr>
+        </p:nvSpPr>
+        <p:spPr/>
+        <p:txBody>
+          <a:bodyPr/>
+          <a:lstStyle/>
+          <a:p>
+            <a:r>
+              <a:rPr lang="pt-BR" dirty="0" smtClean="0"/>
+              <a:t>Focar nos conceitos, técnicas e ferramentas mais relevantes para a compreensão do trabalho</a:t>
+            </a:r>
+          </a:p>
+          <a:p>
+            <a:r>
+              <a:rPr lang="pt-BR" dirty="0" smtClean="0"/>
+              <a:t>Tempo estimado – 3 minutos</a:t>
+            </a:r>
+          </a:p>
+          <a:p>
+            <a:endParaRPr lang="pt-BR" dirty="0" smtClean="0"/>
+          </a:p>
+          <a:p>
+            <a:endParaRPr lang="pt-BR" dirty="0"/>
+          </a:p>
+        </p:txBody>
+      </p:sp>
+      <p:sp>
+        <p:nvSpPr>
+          <p:cNvPr id="4" name="Slide Number Placeholder 3"/>
+          <p:cNvSpPr>
+            <a:spLocks noGrp="1"/>
+          </p:cNvSpPr>
+          <p:nvPr>
+            <p:ph type="sldNum" sz="quarter" idx="10"/>
+          </p:nvPr>
+        </p:nvSpPr>
+        <p:spPr/>
+        <p:txBody>
+          <a:bodyPr/>
+          <a:lstStyle/>
+          <a:p>
+            <a:fld id="{E2E252AF-49A8-4B9A-876F-BED144F54CD8}" type="slidenum">
+              <a:rPr lang="pt-BR" smtClean="0"/>
+              <a:t>9</a:t>
+            </a:fld>
+            <a:endParaRPr lang="pt-BR"/>
+          </a:p>
+        </p:txBody>
+      </p:sp>
+    </p:spTree>
+    <p:extLst>
+      <p:ext uri="{BB962C8B-B14F-4D97-AF65-F5344CB8AC3E}">
+        <p14:creationId xmlns:p14="http://schemas.microsoft.com/office/powerpoint/2010/main" val="2962525214"/>
+      </p:ext>
+    </p:extLst>
+  </p:cSld>
+  <p:clrMapOvr>
+    <a:masterClrMapping/>
+  </p:clrMapOvr>
+</p:notes>
+</file>
+
+<file path=ppt/notesSlides/notesSlide9.xml><?xml version="1.0" encoding="utf-8"?>
+<p:notes xmlns:a="http://schemas.openxmlformats.org/drawingml/2006/main" xmlns:r="http://schemas.openxmlformats.org/officeDocument/2006/relationships" xmlns:p="http://schemas.openxmlformats.org/presentationml/2006/main">
+  <p:cSld>
+    <p:spTree>
+      <p:nvGrpSpPr>
+        <p:cNvPr id="1" name=""/>
+        <p:cNvGrpSpPr/>
+        <p:nvPr/>
+      </p:nvGrpSpPr>
+      <p:grpSpPr>
+        <a:xfrm>
+          <a:off x="0" y="0"/>
+          <a:ext cx="0" cy="0"/>
+          <a:chOff x="0" y="0"/>
+          <a:chExt cx="0" cy="0"/>
+        </a:xfrm>
+      </p:grpSpPr>
+      <p:sp>
+        <p:nvSpPr>
+          <p:cNvPr id="2" name="Slide Image Placeholder 1"/>
+          <p:cNvSpPr>
+            <a:spLocks noGrp="1" noRot="1" noChangeAspect="1"/>
+          </p:cNvSpPr>
+          <p:nvPr>
+            <p:ph type="sldImg"/>
+          </p:nvPr>
+        </p:nvSpPr>
+        <p:spPr/>
+      </p:sp>
+      <p:sp>
+        <p:nvSpPr>
+          <p:cNvPr id="3" name="Notes Placeholder 2"/>
+          <p:cNvSpPr>
+            <a:spLocks noGrp="1"/>
+          </p:cNvSpPr>
+          <p:nvPr>
+            <p:ph type="body" idx="1"/>
+          </p:nvPr>
+        </p:nvSpPr>
+        <p:spPr/>
+        <p:txBody>
+          <a:bodyPr/>
+          <a:lstStyle/>
+          <a:p>
+            <a:r>
+              <a:rPr lang="pt-BR" dirty="0" smtClean="0"/>
+              <a:t>Abordar as características essenciais dos correlatos</a:t>
+            </a:r>
+          </a:p>
+          <a:p>
+            <a:r>
+              <a:rPr lang="pt-BR" dirty="0" smtClean="0"/>
+              <a:t>Tempo estimado – 2 minutos</a:t>
+            </a:r>
+          </a:p>
+        </p:txBody>
+      </p:sp>
+      <p:sp>
+        <p:nvSpPr>
+          <p:cNvPr id="4" name="Slide Number Placeholder 3"/>
+          <p:cNvSpPr>
+            <a:spLocks noGrp="1"/>
+          </p:cNvSpPr>
+          <p:nvPr>
+            <p:ph type="sldNum" sz="quarter" idx="10"/>
+          </p:nvPr>
+        </p:nvSpPr>
+        <p:spPr/>
+        <p:txBody>
+          <a:bodyPr/>
+          <a:lstStyle/>
+          <a:p>
+            <a:fld id="{E2E252AF-49A8-4B9A-876F-BED144F54CD8}" type="slidenum">
+              <a:rPr lang="pt-BR" smtClean="0"/>
+              <a:t>10</a:t>
+            </a:fld>
+            <a:endParaRPr lang="pt-BR"/>
+          </a:p>
+        </p:txBody>
+      </p:sp>
+    </p:spTree>
+    <p:extLst>
+      <p:ext uri="{BB962C8B-B14F-4D97-AF65-F5344CB8AC3E}">
+        <p14:creationId xmlns:p14="http://schemas.microsoft.com/office/powerpoint/2010/main" val="3199269261"/>
+      </p:ext>
+    </p:extLst>
+  </p:cSld>
+  <p:clrMapOvr>
+    <a:masterClrMapping/>
+  </p:clrMapOvr>
+</p:notes>
 </file>
 
 <file path=ppt/slideLayouts/slideLayout1.xml><?xml version="1.0" encoding="utf-8"?>
@@ -326,7 +1795,7 @@
             <a:fld id="{83751E00-8267-4604-A477-06D690F3831A}" type="slidenum">
               <a:rPr lang="pt-BR"/>
               <a:pPr/>
-              <a:t>‹nº›</a:t>
+              <a:t>‹#›</a:t>
             </a:fld>
             <a:endParaRPr lang="pt-BR"/>
           </a:p>
@@ -500,7 +1969,7 @@
             <a:fld id="{3DBB5B2E-7B09-42BA-B78A-718198AF4022}" type="slidenum">
               <a:rPr lang="pt-BR"/>
               <a:pPr/>
-              <a:t>‹nº›</a:t>
+              <a:t>‹#›</a:t>
             </a:fld>
             <a:endParaRPr lang="pt-BR"/>
           </a:p>
@@ -684,7 +2153,7 @@
             <a:fld id="{A3A41635-D202-4D10-8FA9-DA258B96F66E}" type="slidenum">
               <a:rPr lang="pt-BR"/>
               <a:pPr/>
-              <a:t>‹nº›</a:t>
+              <a:t>‹#›</a:t>
             </a:fld>
             <a:endParaRPr lang="pt-BR"/>
           </a:p>
@@ -880,7 +2349,7 @@
             <a:fld id="{6568E297-6CBE-4718-A55E-559A2615A1B7}" type="slidenum">
               <a:rPr lang="pt-BR"/>
               <a:pPr/>
-              <a:t>‹nº›</a:t>
+              <a:t>‹#›</a:t>
             </a:fld>
             <a:endParaRPr lang="pt-BR"/>
           </a:p>
@@ -1076,7 +2545,7 @@
             <a:fld id="{E556A142-61B5-4E3D-90E3-37CCCA5B8200}" type="slidenum">
               <a:rPr lang="pt-BR"/>
               <a:pPr/>
-              <a:t>‹nº›</a:t>
+              <a:t>‹#›</a:t>
             </a:fld>
             <a:endParaRPr lang="pt-BR"/>
           </a:p>
@@ -1368,7 +2837,7 @@
             <a:fld id="{8446EF70-771F-4125-BD92-2CF85D34D26F}" type="slidenum">
               <a:rPr lang="pt-BR"/>
               <a:pPr/>
-              <a:t>‹nº›</a:t>
+              <a:t>‹#›</a:t>
             </a:fld>
             <a:endParaRPr lang="pt-BR"/>
           </a:p>
@@ -1794,7 +3263,7 @@
             <a:fld id="{93E55F65-09CC-47BE-B43C-09A283D2E9B2}" type="slidenum">
               <a:rPr lang="pt-BR"/>
               <a:pPr/>
-              <a:t>‹nº›</a:t>
+              <a:t>‹#›</a:t>
             </a:fld>
             <a:endParaRPr lang="pt-BR"/>
           </a:p>
@@ -1916,7 +3385,7 @@
             <a:fld id="{6802316F-EB17-4252-8A8C-611AED72FBAB}" type="slidenum">
               <a:rPr lang="pt-BR"/>
               <a:pPr/>
-              <a:t>‹nº›</a:t>
+              <a:t>‹#›</a:t>
             </a:fld>
             <a:endParaRPr lang="pt-BR"/>
           </a:p>
@@ -2015,7 +3484,7 @@
             <a:fld id="{FFB138E0-A9D7-4867-995F-585EB895710D}" type="slidenum">
               <a:rPr lang="pt-BR"/>
               <a:pPr/>
-              <a:t>‹nº›</a:t>
+              <a:t>‹#›</a:t>
             </a:fld>
             <a:endParaRPr lang="pt-BR"/>
           </a:p>
@@ -2296,7 +3765,7 @@
             <a:fld id="{43CF3198-B843-4265-ABF0-65946D3BF37C}" type="slidenum">
               <a:rPr lang="pt-BR"/>
               <a:pPr/>
-              <a:t>‹nº›</a:t>
+              <a:t>‹#›</a:t>
             </a:fld>
             <a:endParaRPr lang="pt-BR"/>
           </a:p>
@@ -2553,7 +4022,7 @@
             <a:fld id="{1F0879FC-8726-479C-A2CE-57C987F54908}" type="slidenum">
               <a:rPr lang="pt-BR"/>
               <a:pPr/>
-              <a:t>‹nº›</a:t>
+              <a:t>‹#›</a:t>
             </a:fld>
             <a:endParaRPr lang="pt-BR"/>
           </a:p>
@@ -2839,7 +4308,7 @@
             <a:fld id="{38F5D6D9-064D-480F-AE44-1D22C9D85F98}" type="slidenum">
               <a:rPr lang="pt-BR"/>
               <a:pPr/>
-              <a:t>‹nº›</a:t>
+              <a:t>‹#›</a:t>
             </a:fld>
             <a:endParaRPr lang="pt-BR"/>
           </a:p>
@@ -3266,8 +4735,8 @@
         </p:nvSpPr>
         <p:spPr>
           <a:xfrm>
-            <a:off x="395536" y="2130425"/>
-            <a:ext cx="8352928" cy="1470025"/>
+            <a:off x="143508" y="620688"/>
+            <a:ext cx="8856984" cy="2952328"/>
           </a:xfrm>
         </p:spPr>
         <p:txBody>
@@ -3275,10 +4744,14 @@
           <a:lstStyle/>
           <a:p>
             <a:r>
-              <a:rPr lang="pt-BR" dirty="0" smtClean="0"/>
-              <a:t>Título</a:t>
-            </a:r>
-            <a:endParaRPr lang="pt-BR" dirty="0"/>
+              <a:rPr lang="pt-BR" cap="all" dirty="0">
+                <a:effectLst/>
+              </a:rPr>
+              <a:t>SISTEMAS DE LOCALIZAÇÃO: EXPLORANDO A IPS - BEACONS</a:t>
+            </a:r>
+            <a:endParaRPr lang="pt-BR" dirty="0">
+              <a:effectLst/>
+            </a:endParaRPr>
           </a:p>
         </p:txBody>
       </p:sp>
@@ -3295,17 +4768,13 @@
         <p:spPr/>
         <p:txBody>
           <a:bodyPr>
-            <a:normAutofit/>
+            <a:normAutofit fontScale="92500"/>
           </a:bodyPr>
           <a:lstStyle/>
           <a:p>
             <a:r>
               <a:rPr lang="pt-BR" dirty="0" smtClean="0"/>
-              <a:t>Aluno(a): </a:t>
-            </a:r>
-            <a:r>
-              <a:rPr lang="pt-BR" dirty="0" err="1" smtClean="0"/>
-              <a:t>xxxxx</a:t>
+              <a:t>Aluno: Djonathan Krause</a:t>
             </a:r>
             <a:endParaRPr lang="pt-BR" dirty="0" smtClean="0"/>
           </a:p>
@@ -3318,8 +4787,8 @@
               <a:t>Orientador: </a:t>
             </a:r>
             <a:r>
-              <a:rPr lang="pt-BR" dirty="0" err="1" smtClean="0"/>
-              <a:t>yyyyyyy</a:t>
+              <a:rPr lang="pt-BR" dirty="0"/>
+              <a:t>Dalton Solano dos Reis</a:t>
             </a:r>
             <a:endParaRPr lang="pt-BR" dirty="0"/>
           </a:p>
@@ -3373,8 +4842,8 @@
           <a:lstStyle/>
           <a:p>
             <a:r>
-              <a:rPr lang="pt-BR" smtClean="0"/>
-              <a:t>Operacionalidade da Implementação</a:t>
+              <a:rPr lang="pt-BR" dirty="0" smtClean="0"/>
+              <a:t>Trabalhos Correlatos</a:t>
             </a:r>
             <a:endParaRPr lang="pt-BR" dirty="0"/>
           </a:p>
@@ -3397,29 +4866,379 @@
           <a:p>
             <a:r>
               <a:rPr lang="pt-BR" dirty="0" smtClean="0"/>
-              <a:t>(Apresentar algumas (poucas) telas do software – quando houver. Lembre-se que você irá apresentar o software em funcionamento)</a:t>
-            </a:r>
-          </a:p>
-          <a:p>
+              <a:t>Aplicativo </a:t>
+            </a:r>
+            <a:r>
+              <a:rPr lang="pt-BR" dirty="0"/>
+              <a:t>Tô </a:t>
+            </a:r>
             <a:r>
               <a:rPr lang="pt-BR" dirty="0" smtClean="0"/>
-              <a:t>(Tempo estimado – </a:t>
+              <a:t>Aqui. </a:t>
+            </a:r>
+            <a:r>
+              <a:rPr lang="pt-BR" dirty="0"/>
+              <a:t>Rocha (2015</a:t>
             </a:r>
             <a:r>
               <a:rPr lang="pt-BR" dirty="0" smtClean="0"/>
-              <a:t>1 minuto)</a:t>
-            </a:r>
-            <a:endParaRPr lang="pt-BR" dirty="0" smtClean="0"/>
-          </a:p>
-          <a:p>
+              <a:t>).</a:t>
+            </a:r>
+          </a:p>
+          <a:p>
+            <a:r>
+              <a:rPr lang="pt-BR" dirty="0" smtClean="0"/>
+              <a:t>FURB-MOBILE. Rocha (2016).</a:t>
+            </a:r>
             <a:endParaRPr lang="pt-BR" dirty="0"/>
           </a:p>
-        </p:txBody>
-      </p:sp>
+          <a:p>
+            <a:endParaRPr lang="pt-BR" dirty="0"/>
+          </a:p>
+        </p:txBody>
+      </p:sp>
+      <p:graphicFrame>
+        <p:nvGraphicFramePr>
+          <p:cNvPr id="4" name="Table 3"/>
+          <p:cNvGraphicFramePr>
+            <a:graphicFrameLocks noGrp="1"/>
+          </p:cNvGraphicFramePr>
+          <p:nvPr>
+            <p:extLst>
+              <p:ext uri="{D42A27DB-BD31-4B8C-83A1-F6EECF244321}">
+                <p14:modId xmlns:p14="http://schemas.microsoft.com/office/powerpoint/2010/main" val="3294202321"/>
+              </p:ext>
+            </p:extLst>
+          </p:nvPr>
+        </p:nvGraphicFramePr>
+        <p:xfrm>
+          <a:off x="448464" y="2825936"/>
+          <a:ext cx="8372008" cy="2341266"/>
+        </p:xfrm>
+        <a:graphic>
+          <a:graphicData uri="http://schemas.openxmlformats.org/drawingml/2006/table">
+            <a:tbl>
+              <a:tblPr firstRow="1" bandRow="1">
+                <a:tableStyleId>{5940675A-B579-460E-94D1-54222C63F5DA}</a:tableStyleId>
+              </a:tblPr>
+              <a:tblGrid>
+                <a:gridCol w="3187432">
+                  <a:extLst>
+                    <a:ext uri="{9D8B030D-6E8A-4147-A177-3AD203B41FA5}">
+                      <a16:colId xmlns:a16="http://schemas.microsoft.com/office/drawing/2014/main" val="7270838"/>
+                    </a:ext>
+                  </a:extLst>
+                </a:gridCol>
+                <a:gridCol w="1656184">
+                  <a:extLst>
+                    <a:ext uri="{9D8B030D-6E8A-4147-A177-3AD203B41FA5}">
+                      <a16:colId xmlns:a16="http://schemas.microsoft.com/office/drawing/2014/main" val="1767940997"/>
+                    </a:ext>
+                  </a:extLst>
+                </a:gridCol>
+                <a:gridCol w="1944216">
+                  <a:extLst>
+                    <a:ext uri="{9D8B030D-6E8A-4147-A177-3AD203B41FA5}">
+                      <a16:colId xmlns:a16="http://schemas.microsoft.com/office/drawing/2014/main" val="42835261"/>
+                    </a:ext>
+                  </a:extLst>
+                </a:gridCol>
+                <a:gridCol w="1584176">
+                  <a:extLst>
+                    <a:ext uri="{9D8B030D-6E8A-4147-A177-3AD203B41FA5}">
+                      <a16:colId xmlns:a16="http://schemas.microsoft.com/office/drawing/2014/main" val="2111071986"/>
+                    </a:ext>
+                  </a:extLst>
+                </a:gridCol>
+              </a:tblGrid>
+              <a:tr h="567062">
+                <a:tc>
+                  <a:txBody>
+                    <a:bodyPr/>
+                    <a:lstStyle/>
+                    <a:p>
+                      <a:pPr algn="ctr"/>
+                      <a:r>
+                        <a:rPr lang="pt-BR" dirty="0" smtClean="0"/>
+                        <a:t>X</a:t>
+                      </a:r>
+                      <a:endParaRPr lang="pt-BR" dirty="0"/>
+                    </a:p>
+                  </a:txBody>
+                  <a:tcPr anchor="ctr"/>
+                </a:tc>
+                <a:tc>
+                  <a:txBody>
+                    <a:bodyPr/>
+                    <a:lstStyle/>
+                    <a:p>
+                      <a:pPr algn="ctr"/>
+                      <a:r>
+                        <a:rPr lang="pt-BR" dirty="0" smtClean="0"/>
+                        <a:t>Tô</a:t>
+                      </a:r>
+                      <a:r>
+                        <a:rPr lang="pt-BR" baseline="0" dirty="0" smtClean="0"/>
+                        <a:t> Aqui. Rocha (2015)</a:t>
+                      </a:r>
+                      <a:endParaRPr lang="pt-BR" dirty="0"/>
+                    </a:p>
+                  </a:txBody>
+                  <a:tcPr anchor="ctr"/>
+                </a:tc>
+                <a:tc>
+                  <a:txBody>
+                    <a:bodyPr/>
+                    <a:lstStyle/>
+                    <a:p>
+                      <a:pPr algn="ctr"/>
+                      <a:r>
+                        <a:rPr lang="pt-BR" dirty="0" smtClean="0"/>
+                        <a:t>FURB-MOBILE</a:t>
+                      </a:r>
+                      <a:r>
+                        <a:rPr lang="pt-BR" baseline="0" dirty="0" smtClean="0"/>
+                        <a:t>. Rocha (2016)</a:t>
+                      </a:r>
+                      <a:endParaRPr lang="pt-BR" dirty="0"/>
+                    </a:p>
+                  </a:txBody>
+                  <a:tcPr anchor="ctr"/>
+                </a:tc>
+                <a:tc>
+                  <a:txBody>
+                    <a:bodyPr/>
+                    <a:lstStyle/>
+                    <a:p>
+                      <a:pPr algn="ctr"/>
+                      <a:r>
+                        <a:rPr lang="pt-BR" dirty="0" smtClean="0"/>
+                        <a:t>IPS</a:t>
+                      </a:r>
+                      <a:r>
+                        <a:rPr lang="pt-BR" baseline="0" dirty="0" smtClean="0"/>
+                        <a:t>. Krause (2018)</a:t>
+                      </a:r>
+                      <a:endParaRPr lang="pt-BR" dirty="0"/>
+                    </a:p>
+                  </a:txBody>
+                  <a:tcPr anchor="ctr"/>
+                </a:tc>
+                <a:extLst>
+                  <a:ext uri="{0D108BD9-81ED-4DB2-BD59-A6C34878D82A}">
+                    <a16:rowId xmlns:a16="http://schemas.microsoft.com/office/drawing/2014/main" val="4178599631"/>
+                  </a:ext>
+                </a:extLst>
+              </a:tr>
+              <a:tr h="567062">
+                <a:tc>
+                  <a:txBody>
+                    <a:bodyPr/>
+                    <a:lstStyle/>
+                    <a:p>
+                      <a:pPr algn="ctr"/>
+                      <a:r>
+                        <a:rPr lang="pt-BR" dirty="0" smtClean="0"/>
+                        <a:t>Utiliza beacons</a:t>
+                      </a:r>
+                      <a:endParaRPr lang="pt-BR" dirty="0"/>
+                    </a:p>
+                  </a:txBody>
+                  <a:tcPr anchor="ctr"/>
+                </a:tc>
+                <a:tc>
+                  <a:txBody>
+                    <a:bodyPr/>
+                    <a:lstStyle/>
+                    <a:p>
+                      <a:pPr algn="ctr"/>
+                      <a:r>
+                        <a:rPr lang="pt-BR" dirty="0" smtClean="0"/>
+                        <a:t>Sim</a:t>
+                      </a:r>
+                      <a:endParaRPr lang="pt-BR" dirty="0"/>
+                    </a:p>
+                  </a:txBody>
+                  <a:tcPr anchor="ctr"/>
+                </a:tc>
+                <a:tc>
+                  <a:txBody>
+                    <a:bodyPr/>
+                    <a:lstStyle/>
+                    <a:p>
+                      <a:pPr algn="ctr"/>
+                      <a:r>
+                        <a:rPr lang="pt-BR" dirty="0" smtClean="0"/>
+                        <a:t>Não</a:t>
+                      </a:r>
+                      <a:endParaRPr lang="pt-BR" dirty="0"/>
+                    </a:p>
+                  </a:txBody>
+                  <a:tcPr anchor="ctr"/>
+                </a:tc>
+                <a:tc>
+                  <a:txBody>
+                    <a:bodyPr/>
+                    <a:lstStyle/>
+                    <a:p>
+                      <a:pPr algn="ctr"/>
+                      <a:r>
+                        <a:rPr lang="pt-BR" dirty="0" smtClean="0"/>
+                        <a:t>Sim</a:t>
+                      </a:r>
+                      <a:endParaRPr lang="pt-BR" dirty="0"/>
+                    </a:p>
+                  </a:txBody>
+                  <a:tcPr anchor="ctr"/>
+                </a:tc>
+                <a:extLst>
+                  <a:ext uri="{0D108BD9-81ED-4DB2-BD59-A6C34878D82A}">
+                    <a16:rowId xmlns:a16="http://schemas.microsoft.com/office/drawing/2014/main" val="2590950669"/>
+                  </a:ext>
+                </a:extLst>
+              </a:tr>
+              <a:tr h="567062">
+                <a:tc>
+                  <a:txBody>
+                    <a:bodyPr/>
+                    <a:lstStyle/>
+                    <a:p>
+                      <a:pPr algn="ctr"/>
+                      <a:r>
+                        <a:rPr lang="pt-BR" dirty="0" smtClean="0"/>
+                        <a:t>Permite navegação por rotas</a:t>
+                      </a:r>
+                      <a:endParaRPr lang="pt-BR" dirty="0"/>
+                    </a:p>
+                  </a:txBody>
+                  <a:tcPr anchor="ctr"/>
+                </a:tc>
+                <a:tc>
+                  <a:txBody>
+                    <a:bodyPr/>
+                    <a:lstStyle/>
+                    <a:p>
+                      <a:pPr algn="ctr"/>
+                      <a:r>
+                        <a:rPr lang="pt-BR" dirty="0" smtClean="0"/>
+                        <a:t>Sim</a:t>
+                      </a:r>
+                      <a:endParaRPr lang="pt-BR" dirty="0"/>
+                    </a:p>
+                  </a:txBody>
+                  <a:tcPr anchor="ctr"/>
+                </a:tc>
+                <a:tc>
+                  <a:txBody>
+                    <a:bodyPr/>
+                    <a:lstStyle/>
+                    <a:p>
+                      <a:pPr algn="ctr"/>
+                      <a:r>
+                        <a:rPr lang="pt-BR" dirty="0" smtClean="0"/>
+                        <a:t>Sim</a:t>
+                      </a:r>
+                      <a:endParaRPr lang="pt-BR" dirty="0"/>
+                    </a:p>
+                  </a:txBody>
+                  <a:tcPr anchor="ctr"/>
+                </a:tc>
+                <a:tc>
+                  <a:txBody>
+                    <a:bodyPr/>
+                    <a:lstStyle/>
+                    <a:p>
+                      <a:pPr algn="ctr"/>
+                      <a:r>
+                        <a:rPr lang="pt-BR" dirty="0" smtClean="0"/>
+                        <a:t>Não</a:t>
+                      </a:r>
+                      <a:endParaRPr lang="pt-BR" dirty="0"/>
+                    </a:p>
+                  </a:txBody>
+                  <a:tcPr anchor="ctr"/>
+                </a:tc>
+                <a:extLst>
+                  <a:ext uri="{0D108BD9-81ED-4DB2-BD59-A6C34878D82A}">
+                    <a16:rowId xmlns:a16="http://schemas.microsoft.com/office/drawing/2014/main" val="326082420"/>
+                  </a:ext>
+                </a:extLst>
+              </a:tr>
+              <a:tr h="567062">
+                <a:tc>
+                  <a:txBody>
+                    <a:bodyPr/>
+                    <a:lstStyle/>
+                    <a:p>
+                      <a:pPr algn="ctr"/>
+                      <a:r>
+                        <a:rPr lang="pt-BR" dirty="0" smtClean="0"/>
+                        <a:t>Permite localização indoor</a:t>
+                      </a:r>
+                      <a:endParaRPr lang="pt-BR" dirty="0"/>
+                    </a:p>
+                  </a:txBody>
+                  <a:tcPr anchor="ctr"/>
+                </a:tc>
+                <a:tc>
+                  <a:txBody>
+                    <a:bodyPr/>
+                    <a:lstStyle/>
+                    <a:p>
+                      <a:pPr algn="ctr"/>
+                      <a:r>
+                        <a:rPr lang="pt-BR" dirty="0" smtClean="0"/>
+                        <a:t>Sim</a:t>
+                      </a:r>
+                      <a:endParaRPr lang="pt-BR" dirty="0"/>
+                    </a:p>
+                  </a:txBody>
+                  <a:tcPr anchor="ctr"/>
+                </a:tc>
+                <a:tc>
+                  <a:txBody>
+                    <a:bodyPr/>
+                    <a:lstStyle/>
+                    <a:p>
+                      <a:pPr algn="ctr"/>
+                      <a:r>
+                        <a:rPr lang="pt-BR" dirty="0" smtClean="0"/>
+                        <a:t>Sim</a:t>
+                      </a:r>
+                      <a:endParaRPr lang="pt-BR" dirty="0"/>
+                    </a:p>
+                  </a:txBody>
+                  <a:tcPr anchor="ctr"/>
+                </a:tc>
+                <a:tc>
+                  <a:txBody>
+                    <a:bodyPr/>
+                    <a:lstStyle/>
+                    <a:p>
+                      <a:pPr algn="ctr"/>
+                      <a:r>
+                        <a:rPr lang="pt-BR" dirty="0" smtClean="0"/>
+                        <a:t>Sim</a:t>
+                      </a:r>
+                      <a:endParaRPr lang="pt-BR" dirty="0"/>
+                    </a:p>
+                  </a:txBody>
+                  <a:tcPr anchor="ctr"/>
+                </a:tc>
+                <a:extLst>
+                  <a:ext uri="{0D108BD9-81ED-4DB2-BD59-A6C34878D82A}">
+                    <a16:rowId xmlns:a16="http://schemas.microsoft.com/office/drawing/2014/main" val="1682404594"/>
+                  </a:ext>
+                </a:extLst>
+              </a:tr>
+            </a:tbl>
+          </a:graphicData>
+        </a:graphic>
+      </p:graphicFrame>
     </p:spTree>
     <p:extLst>
       <p:ext uri="{BB962C8B-B14F-4D97-AF65-F5344CB8AC3E}">
-        <p14:creationId xmlns:p14="http://schemas.microsoft.com/office/powerpoint/2010/main" val="1817476911"/>
+        <p14:creationId xmlns:p14="http://schemas.microsoft.com/office/powerpoint/2010/main" val="1958979546"/>
       </p:ext>
     </p:extLst>
   </p:cSld>
@@ -3470,6 +5289,634 @@
           <a:p>
             <a:r>
               <a:rPr lang="pt-BR" dirty="0" smtClean="0"/>
+              <a:t>Requisitos</a:t>
+            </a:r>
+            <a:endParaRPr lang="pt-BR" dirty="0"/>
+          </a:p>
+        </p:txBody>
+      </p:sp>
+      <p:sp>
+        <p:nvSpPr>
+          <p:cNvPr id="3" name="Espaço Reservado para Conteúdo 2"/>
+          <p:cNvSpPr>
+            <a:spLocks noGrp="1"/>
+          </p:cNvSpPr>
+          <p:nvPr>
+            <p:ph idx="1"/>
+          </p:nvPr>
+        </p:nvSpPr>
+        <p:spPr/>
+        <p:txBody>
+          <a:bodyPr/>
+          <a:lstStyle/>
+          <a:p>
+            <a:r>
+              <a:rPr lang="pt-BR" dirty="0" smtClean="0"/>
+              <a:t>(Apresentar os requisitos funcionais e não funcionais do trabalho)</a:t>
+            </a:r>
+          </a:p>
+          <a:p>
+            <a:r>
+              <a:rPr lang="pt-BR" dirty="0" smtClean="0"/>
+              <a:t>(Tempo estimado – 2 minutos)</a:t>
+            </a:r>
+          </a:p>
+          <a:p>
+            <a:endParaRPr lang="pt-BR" dirty="0"/>
+          </a:p>
+        </p:txBody>
+      </p:sp>
+    </p:spTree>
+    <p:extLst>
+      <p:ext uri="{BB962C8B-B14F-4D97-AF65-F5344CB8AC3E}">
+        <p14:creationId xmlns:p14="http://schemas.microsoft.com/office/powerpoint/2010/main" val="1997644590"/>
+      </p:ext>
+    </p:extLst>
+  </p:cSld>
+  <p:clrMapOvr>
+    <a:masterClrMapping/>
+  </p:clrMapOvr>
+  <p:timing>
+    <p:tnLst>
+      <p:par>
+        <p:cTn id="1" dur="indefinite" restart="never" nodeType="tmRoot"/>
+      </p:par>
+    </p:tnLst>
+  </p:timing>
+</p:sld>
+</file>
+
+<file path=ppt/slides/slide12.xml><?xml version="1.0" encoding="utf-8"?>
+<p:sld xmlns:a="http://schemas.openxmlformats.org/drawingml/2006/main" xmlns:r="http://schemas.openxmlformats.org/officeDocument/2006/relationships" xmlns:p="http://schemas.openxmlformats.org/presentationml/2006/main">
+  <p:cSld>
+    <p:spTree>
+      <p:nvGrpSpPr>
+        <p:cNvPr id="1" name=""/>
+        <p:cNvGrpSpPr/>
+        <p:nvPr/>
+      </p:nvGrpSpPr>
+      <p:grpSpPr>
+        <a:xfrm>
+          <a:off x="0" y="0"/>
+          <a:ext cx="0" cy="0"/>
+          <a:chOff x="0" y="0"/>
+          <a:chExt cx="0" cy="0"/>
+        </a:xfrm>
+      </p:grpSpPr>
+      <p:sp>
+        <p:nvSpPr>
+          <p:cNvPr id="2" name="Título 1"/>
+          <p:cNvSpPr>
+            <a:spLocks noGrp="1"/>
+          </p:cNvSpPr>
+          <p:nvPr>
+            <p:ph type="title"/>
+          </p:nvPr>
+        </p:nvSpPr>
+        <p:spPr/>
+        <p:txBody>
+          <a:bodyPr/>
+          <a:lstStyle/>
+          <a:p>
+            <a:r>
+              <a:rPr lang="pt-BR" dirty="0" smtClean="0"/>
+              <a:t>Arquitetura</a:t>
+            </a:r>
+            <a:endParaRPr lang="pt-BR" dirty="0"/>
+          </a:p>
+        </p:txBody>
+      </p:sp>
+      <p:pic>
+        <p:nvPicPr>
+          <p:cNvPr id="1027" name="Picture 3" descr="Diagramas-Estrutura de Dados (1)"/>
+          <p:cNvPicPr>
+            <a:picLocks noChangeAspect="1" noChangeArrowheads="1"/>
+          </p:cNvPicPr>
+          <p:nvPr/>
+        </p:nvPicPr>
+        <p:blipFill>
+          <a:blip r:embed="rId3">
+            <a:extLst>
+              <a:ext uri="{28A0092B-C50C-407E-A947-70E740481C1C}">
+                <a14:useLocalDpi xmlns:a14="http://schemas.microsoft.com/office/drawing/2010/main" val="0"/>
+              </a:ext>
+            </a:extLst>
+          </a:blip>
+          <a:srcRect/>
+          <a:stretch>
+            <a:fillRect/>
+          </a:stretch>
+        </p:blipFill>
+        <p:spPr bwMode="auto">
+          <a:xfrm>
+            <a:off x="107504" y="1268760"/>
+            <a:ext cx="8894538" cy="4032448"/>
+          </a:xfrm>
+          <a:prstGeom prst="rect">
+            <a:avLst/>
+          </a:prstGeom>
+          <a:noFill/>
+          <a:ln>
+            <a:noFill/>
+          </a:ln>
+          <a:extLst>
+            <a:ext uri="{909E8E84-426E-40DD-AFC4-6F175D3DCCD1}">
+              <a14:hiddenFill xmlns:a14="http://schemas.microsoft.com/office/drawing/2010/main">
+                <a:solidFill>
+                  <a:srgbClr val="FFFFFF"/>
+                </a:solidFill>
+              </a14:hiddenFill>
+            </a:ext>
+            <a:ext uri="{91240B29-F687-4F45-9708-019B960494DF}">
+              <a14:hiddenLine xmlns:a14="http://schemas.microsoft.com/office/drawing/2010/main" w="9525">
+                <a:solidFill>
+                  <a:srgbClr val="000000"/>
+                </a:solidFill>
+                <a:miter lim="800000"/>
+                <a:headEnd/>
+                <a:tailEnd/>
+              </a14:hiddenLine>
+            </a:ext>
+          </a:extLst>
+        </p:spPr>
+      </p:pic>
+    </p:spTree>
+    <p:extLst>
+      <p:ext uri="{BB962C8B-B14F-4D97-AF65-F5344CB8AC3E}">
+        <p14:creationId xmlns:p14="http://schemas.microsoft.com/office/powerpoint/2010/main" val="2007070856"/>
+      </p:ext>
+    </p:extLst>
+  </p:cSld>
+  <p:clrMapOvr>
+    <a:masterClrMapping/>
+  </p:clrMapOvr>
+  <p:timing>
+    <p:tnLst>
+      <p:par>
+        <p:cTn id="1" dur="indefinite" restart="never" nodeType="tmRoot"/>
+      </p:par>
+    </p:tnLst>
+  </p:timing>
+</p:sld>
+</file>
+
+<file path=ppt/slides/slide13.xml><?xml version="1.0" encoding="utf-8"?>
+<p:sld xmlns:a="http://schemas.openxmlformats.org/drawingml/2006/main" xmlns:r="http://schemas.openxmlformats.org/officeDocument/2006/relationships" xmlns:p="http://schemas.openxmlformats.org/presentationml/2006/main">
+  <p:cSld>
+    <p:spTree>
+      <p:nvGrpSpPr>
+        <p:cNvPr id="1" name=""/>
+        <p:cNvGrpSpPr/>
+        <p:nvPr/>
+      </p:nvGrpSpPr>
+      <p:grpSpPr>
+        <a:xfrm>
+          <a:off x="0" y="0"/>
+          <a:ext cx="0" cy="0"/>
+          <a:chOff x="0" y="0"/>
+          <a:chExt cx="0" cy="0"/>
+        </a:xfrm>
+      </p:grpSpPr>
+      <p:sp>
+        <p:nvSpPr>
+          <p:cNvPr id="2" name="Título 1"/>
+          <p:cNvSpPr>
+            <a:spLocks noGrp="1"/>
+          </p:cNvSpPr>
+          <p:nvPr>
+            <p:ph type="title"/>
+          </p:nvPr>
+        </p:nvSpPr>
+        <p:spPr/>
+        <p:txBody>
+          <a:bodyPr/>
+          <a:lstStyle/>
+          <a:p>
+            <a:r>
+              <a:rPr lang="pt-BR" dirty="0" smtClean="0"/>
+              <a:t>Plataformas de Testes: Distância em porcentagem</a:t>
+            </a:r>
+            <a:endParaRPr lang="pt-BR" dirty="0"/>
+          </a:p>
+        </p:txBody>
+      </p:sp>
+      <p:pic>
+        <p:nvPicPr>
+          <p:cNvPr id="2050" name="Picture 2" descr="testes_porcentagem"/>
+          <p:cNvPicPr>
+            <a:picLocks noChangeAspect="1" noChangeArrowheads="1"/>
+          </p:cNvPicPr>
+          <p:nvPr/>
+        </p:nvPicPr>
+        <p:blipFill>
+          <a:blip r:embed="rId2">
+            <a:extLst>
+              <a:ext uri="{28A0092B-C50C-407E-A947-70E740481C1C}">
+                <a14:useLocalDpi xmlns:a14="http://schemas.microsoft.com/office/drawing/2010/main" val="0"/>
+              </a:ext>
+            </a:extLst>
+          </a:blip>
+          <a:srcRect/>
+          <a:stretch>
+            <a:fillRect/>
+          </a:stretch>
+        </p:blipFill>
+        <p:spPr bwMode="auto">
+          <a:xfrm>
+            <a:off x="107504" y="2636912"/>
+            <a:ext cx="8956687" cy="3024336"/>
+          </a:xfrm>
+          <a:prstGeom prst="rect">
+            <a:avLst/>
+          </a:prstGeom>
+          <a:noFill/>
+          <a:ln>
+            <a:noFill/>
+          </a:ln>
+          <a:extLst>
+            <a:ext uri="{909E8E84-426E-40DD-AFC4-6F175D3DCCD1}">
+              <a14:hiddenFill xmlns:a14="http://schemas.microsoft.com/office/drawing/2010/main">
+                <a:solidFill>
+                  <a:srgbClr val="FFFFFF"/>
+                </a:solidFill>
+              </a14:hiddenFill>
+            </a:ext>
+            <a:ext uri="{91240B29-F687-4F45-9708-019B960494DF}">
+              <a14:hiddenLine xmlns:a14="http://schemas.microsoft.com/office/drawing/2010/main" w="9525">
+                <a:solidFill>
+                  <a:srgbClr val="000000"/>
+                </a:solidFill>
+                <a:miter lim="800000"/>
+                <a:headEnd/>
+                <a:tailEnd/>
+              </a14:hiddenLine>
+            </a:ext>
+          </a:extLst>
+        </p:spPr>
+      </p:pic>
+    </p:spTree>
+    <p:extLst>
+      <p:ext uri="{BB962C8B-B14F-4D97-AF65-F5344CB8AC3E}">
+        <p14:creationId xmlns:p14="http://schemas.microsoft.com/office/powerpoint/2010/main" val="3063325790"/>
+      </p:ext>
+    </p:extLst>
+  </p:cSld>
+  <p:clrMapOvr>
+    <a:masterClrMapping/>
+  </p:clrMapOvr>
+  <p:timing>
+    <p:tnLst>
+      <p:par>
+        <p:cTn id="1" dur="indefinite" restart="never" nodeType="tmRoot"/>
+      </p:par>
+    </p:tnLst>
+  </p:timing>
+</p:sld>
+</file>
+
+<file path=ppt/slides/slide14.xml><?xml version="1.0" encoding="utf-8"?>
+<p:sld xmlns:a="http://schemas.openxmlformats.org/drawingml/2006/main" xmlns:r="http://schemas.openxmlformats.org/officeDocument/2006/relationships" xmlns:p="http://schemas.openxmlformats.org/presentationml/2006/main">
+  <p:cSld>
+    <p:spTree>
+      <p:nvGrpSpPr>
+        <p:cNvPr id="1" name=""/>
+        <p:cNvGrpSpPr/>
+        <p:nvPr/>
+      </p:nvGrpSpPr>
+      <p:grpSpPr>
+        <a:xfrm>
+          <a:off x="0" y="0"/>
+          <a:ext cx="0" cy="0"/>
+          <a:chOff x="0" y="0"/>
+          <a:chExt cx="0" cy="0"/>
+        </a:xfrm>
+      </p:grpSpPr>
+      <p:sp>
+        <p:nvSpPr>
+          <p:cNvPr id="2" name="Título 1"/>
+          <p:cNvSpPr>
+            <a:spLocks noGrp="1"/>
+          </p:cNvSpPr>
+          <p:nvPr>
+            <p:ph type="title"/>
+          </p:nvPr>
+        </p:nvSpPr>
+        <p:spPr/>
+        <p:txBody>
+          <a:bodyPr/>
+          <a:lstStyle/>
+          <a:p>
+            <a:r>
+              <a:rPr lang="pt-BR" dirty="0" smtClean="0"/>
+              <a:t>Plataformas de Testes:</a:t>
+            </a:r>
+            <a:br>
+              <a:rPr lang="pt-BR" dirty="0" smtClean="0"/>
+            </a:br>
+            <a:r>
+              <a:rPr lang="pt-BR" dirty="0" smtClean="0"/>
+              <a:t>Trilateração</a:t>
+            </a:r>
+            <a:endParaRPr lang="pt-BR" dirty="0"/>
+          </a:p>
+        </p:txBody>
+      </p:sp>
+      <p:pic>
+        <p:nvPicPr>
+          <p:cNvPr id="3074" name="Picture 2" descr="testes_trilateração"/>
+          <p:cNvPicPr>
+            <a:picLocks noChangeAspect="1" noChangeArrowheads="1"/>
+          </p:cNvPicPr>
+          <p:nvPr/>
+        </p:nvPicPr>
+        <p:blipFill>
+          <a:blip r:embed="rId2">
+            <a:extLst>
+              <a:ext uri="{28A0092B-C50C-407E-A947-70E740481C1C}">
+                <a14:useLocalDpi xmlns:a14="http://schemas.microsoft.com/office/drawing/2010/main" val="0"/>
+              </a:ext>
+            </a:extLst>
+          </a:blip>
+          <a:srcRect/>
+          <a:stretch>
+            <a:fillRect/>
+          </a:stretch>
+        </p:blipFill>
+        <p:spPr bwMode="auto">
+          <a:xfrm>
+            <a:off x="971600" y="1628800"/>
+            <a:ext cx="7560840" cy="4863254"/>
+          </a:xfrm>
+          <a:prstGeom prst="rect">
+            <a:avLst/>
+          </a:prstGeom>
+          <a:noFill/>
+          <a:ln>
+            <a:noFill/>
+          </a:ln>
+          <a:extLst>
+            <a:ext uri="{909E8E84-426E-40DD-AFC4-6F175D3DCCD1}">
+              <a14:hiddenFill xmlns:a14="http://schemas.microsoft.com/office/drawing/2010/main">
+                <a:solidFill>
+                  <a:srgbClr val="FFFFFF"/>
+                </a:solidFill>
+              </a14:hiddenFill>
+            </a:ext>
+            <a:ext uri="{91240B29-F687-4F45-9708-019B960494DF}">
+              <a14:hiddenLine xmlns:a14="http://schemas.microsoft.com/office/drawing/2010/main" w="9525">
+                <a:solidFill>
+                  <a:srgbClr val="000000"/>
+                </a:solidFill>
+                <a:miter lim="800000"/>
+                <a:headEnd/>
+                <a:tailEnd/>
+              </a14:hiddenLine>
+            </a:ext>
+          </a:extLst>
+        </p:spPr>
+      </p:pic>
+    </p:spTree>
+    <p:extLst>
+      <p:ext uri="{BB962C8B-B14F-4D97-AF65-F5344CB8AC3E}">
+        <p14:creationId xmlns:p14="http://schemas.microsoft.com/office/powerpoint/2010/main" val="3573614678"/>
+      </p:ext>
+    </p:extLst>
+  </p:cSld>
+  <p:clrMapOvr>
+    <a:masterClrMapping/>
+  </p:clrMapOvr>
+  <p:timing>
+    <p:tnLst>
+      <p:par>
+        <p:cTn id="1" dur="indefinite" restart="never" nodeType="tmRoot"/>
+      </p:par>
+    </p:tnLst>
+  </p:timing>
+</p:sld>
+</file>
+
+<file path=ppt/slides/slide15.xml><?xml version="1.0" encoding="utf-8"?>
+<p:sld xmlns:a="http://schemas.openxmlformats.org/drawingml/2006/main" xmlns:r="http://schemas.openxmlformats.org/officeDocument/2006/relationships" xmlns:p="http://schemas.openxmlformats.org/presentationml/2006/main">
+  <p:cSld>
+    <p:spTree>
+      <p:nvGrpSpPr>
+        <p:cNvPr id="1" name=""/>
+        <p:cNvGrpSpPr/>
+        <p:nvPr/>
+      </p:nvGrpSpPr>
+      <p:grpSpPr>
+        <a:xfrm>
+          <a:off x="0" y="0"/>
+          <a:ext cx="0" cy="0"/>
+          <a:chOff x="0" y="0"/>
+          <a:chExt cx="0" cy="0"/>
+        </a:xfrm>
+      </p:grpSpPr>
+      <p:sp>
+        <p:nvSpPr>
+          <p:cNvPr id="2" name="Título 1"/>
+          <p:cNvSpPr>
+            <a:spLocks noGrp="1"/>
+          </p:cNvSpPr>
+          <p:nvPr>
+            <p:ph type="title"/>
+          </p:nvPr>
+        </p:nvSpPr>
+        <p:spPr/>
+        <p:txBody>
+          <a:bodyPr/>
+          <a:lstStyle/>
+          <a:p>
+            <a:r>
+              <a:rPr lang="pt-BR" dirty="0" smtClean="0"/>
+              <a:t>Aplicativo e Mapa</a:t>
+            </a:r>
+            <a:endParaRPr lang="pt-BR" dirty="0"/>
+          </a:p>
+        </p:txBody>
+      </p:sp>
+      <p:pic>
+        <p:nvPicPr>
+          <p:cNvPr id="4" name="Picture 3"/>
+          <p:cNvPicPr>
+            <a:picLocks noChangeAspect="1"/>
+          </p:cNvPicPr>
+          <p:nvPr/>
+        </p:nvPicPr>
+        <p:blipFill>
+          <a:blip r:embed="rId3"/>
+          <a:stretch>
+            <a:fillRect/>
+          </a:stretch>
+        </p:blipFill>
+        <p:spPr>
+          <a:xfrm>
+            <a:off x="899592" y="1452230"/>
+            <a:ext cx="3072929" cy="4940025"/>
+          </a:xfrm>
+          <a:prstGeom prst="rect">
+            <a:avLst/>
+          </a:prstGeom>
+        </p:spPr>
+      </p:pic>
+      <p:sp>
+        <p:nvSpPr>
+          <p:cNvPr id="6" name="Rectangle 2"/>
+          <p:cNvSpPr>
+            <a:spLocks noChangeArrowheads="1"/>
+          </p:cNvSpPr>
+          <p:nvPr/>
+        </p:nvSpPr>
+        <p:spPr bwMode="auto">
+          <a:xfrm rot="5400000" flipV="1">
+            <a:off x="4434344" y="3330265"/>
+            <a:ext cx="8532653" cy="45719"/>
+          </a:xfrm>
+          <a:prstGeom prst="rect">
+            <a:avLst/>
+          </a:prstGeom>
+          <a:noFill/>
+          <a:ln>
+            <a:noFill/>
+          </a:ln>
+          <a:effectLst/>
+          <a:extLst>
+            <a:ext uri="{909E8E84-426E-40DD-AFC4-6F175D3DCCD1}">
+              <a14:hiddenFill xmlns:a14="http://schemas.microsoft.com/office/drawing/2010/main">
+                <a:solidFill>
+                  <a:schemeClr val="accent1"/>
+                </a:solidFill>
+              </a14:hiddenFill>
+            </a:ext>
+            <a:ext uri="{91240B29-F687-4F45-9708-019B960494DF}">
+              <a14:hiddenLine xmlns:a14="http://schemas.microsoft.com/office/drawing/2010/main" w="9525">
+                <a:solidFill>
+                  <a:schemeClr val="tx1"/>
+                </a:solidFill>
+                <a:miter lim="800000"/>
+                <a:headEnd/>
+                <a:tailEnd/>
+              </a14:hiddenLine>
+            </a:ext>
+            <a:ext uri="{AF507438-7753-43E0-B8FC-AC1667EBCBE1}">
+              <a14:hiddenEffects xmlns:a14="http://schemas.microsoft.com/office/drawing/2010/main">
+                <a:effectLst>
+                  <a:outerShdw dist="35921" dir="2700000" algn="ctr" rotWithShape="0">
+                    <a:schemeClr val="bg2"/>
+                  </a:outerShdw>
+                </a:effectLst>
+              </a14:hiddenEffects>
+            </a:ext>
+          </a:extLst>
+        </p:spPr>
+        <p:txBody>
+          <a:bodyPr vert="horz" wrap="square" lIns="91440" tIns="45720" rIns="91440" bIns="45720" numCol="1" anchor="ctr" anchorCtr="0" compatLnSpc="1">
+            <a:prstTxWarp prst="textNoShape">
+              <a:avLst/>
+            </a:prstTxWarp>
+            <a:spAutoFit/>
+          </a:bodyPr>
+          <a:lstStyle/>
+          <a:p>
+            <a:endParaRPr lang="pt-BR"/>
+          </a:p>
+        </p:txBody>
+      </p:sp>
+      <p:pic>
+        <p:nvPicPr>
+          <p:cNvPr id="4097" name="Picture 1" descr="mapa_com_fila_vazia"/>
+          <p:cNvPicPr>
+            <a:picLocks noChangeAspect="1" noChangeArrowheads="1"/>
+          </p:cNvPicPr>
+          <p:nvPr/>
+        </p:nvPicPr>
+        <p:blipFill>
+          <a:blip r:embed="rId4">
+            <a:extLst>
+              <a:ext uri="{28A0092B-C50C-407E-A947-70E740481C1C}">
+                <a14:useLocalDpi xmlns:a14="http://schemas.microsoft.com/office/drawing/2010/main" val="0"/>
+              </a:ext>
+            </a:extLst>
+          </a:blip>
+          <a:srcRect/>
+          <a:stretch>
+            <a:fillRect/>
+          </a:stretch>
+        </p:blipFill>
+        <p:spPr bwMode="auto">
+          <a:xfrm rot="5400000">
+            <a:off x="3326122" y="2338067"/>
+            <a:ext cx="4940025" cy="3168352"/>
+          </a:xfrm>
+          <a:prstGeom prst="rect">
+            <a:avLst/>
+          </a:prstGeom>
+          <a:noFill/>
+          <a:extLst>
+            <a:ext uri="{909E8E84-426E-40DD-AFC4-6F175D3DCCD1}">
+              <a14:hiddenFill xmlns:a14="http://schemas.microsoft.com/office/drawing/2010/main">
+                <a:solidFill>
+                  <a:srgbClr val="FFFFFF"/>
+                </a:solidFill>
+              </a14:hiddenFill>
+            </a:ext>
+          </a:extLst>
+        </p:spPr>
+      </p:pic>
+    </p:spTree>
+    <p:extLst>
+      <p:ext uri="{BB962C8B-B14F-4D97-AF65-F5344CB8AC3E}">
+        <p14:creationId xmlns:p14="http://schemas.microsoft.com/office/powerpoint/2010/main" val="1817476911"/>
+      </p:ext>
+    </p:extLst>
+  </p:cSld>
+  <p:clrMapOvr>
+    <a:masterClrMapping/>
+  </p:clrMapOvr>
+  <p:timing>
+    <p:tnLst>
+      <p:par>
+        <p:cTn id="1" dur="indefinite" restart="never" nodeType="tmRoot"/>
+      </p:par>
+    </p:tnLst>
+  </p:timing>
+</p:sld>
+</file>
+
+<file path=ppt/slides/slide16.xml><?xml version="1.0" encoding="utf-8"?>
+<p:sld xmlns:a="http://schemas.openxmlformats.org/drawingml/2006/main" xmlns:r="http://schemas.openxmlformats.org/officeDocument/2006/relationships" xmlns:p="http://schemas.openxmlformats.org/presentationml/2006/main">
+  <p:cSld>
+    <p:spTree>
+      <p:nvGrpSpPr>
+        <p:cNvPr id="1" name=""/>
+        <p:cNvGrpSpPr/>
+        <p:nvPr/>
+      </p:nvGrpSpPr>
+      <p:grpSpPr>
+        <a:xfrm>
+          <a:off x="0" y="0"/>
+          <a:ext cx="0" cy="0"/>
+          <a:chOff x="0" y="0"/>
+          <a:chExt cx="0" cy="0"/>
+        </a:xfrm>
+      </p:grpSpPr>
+      <p:sp>
+        <p:nvSpPr>
+          <p:cNvPr id="2" name="Título 1"/>
+          <p:cNvSpPr>
+            <a:spLocks noGrp="1"/>
+          </p:cNvSpPr>
+          <p:nvPr>
+            <p:ph type="title"/>
+          </p:nvPr>
+        </p:nvSpPr>
+        <p:spPr/>
+        <p:txBody>
+          <a:bodyPr/>
+          <a:lstStyle/>
+          <a:p>
+            <a:r>
+              <a:rPr lang="pt-BR" dirty="0" smtClean="0"/>
               <a:t>Resultados e Discussões</a:t>
             </a:r>
             <a:endParaRPr lang="pt-BR" dirty="0"/>
@@ -3505,15 +5952,7 @@
           <a:p>
             <a:r>
               <a:rPr lang="pt-BR" dirty="0" smtClean="0"/>
-              <a:t>(Tempo estimado – </a:t>
-            </a:r>
-            <a:r>
-              <a:rPr lang="pt-BR" dirty="0" smtClean="0"/>
-              <a:t>4 </a:t>
-            </a:r>
-            <a:r>
-              <a:rPr lang="pt-BR" dirty="0" smtClean="0"/>
-              <a:t>minutos)</a:t>
+              <a:t>(Tempo estimado – 4 minutos)</a:t>
             </a:r>
           </a:p>
           <a:p>
@@ -3541,7 +5980,7 @@
 </p:sld>
 </file>
 
-<file path=ppt/slides/slide12.xml><?xml version="1.0" encoding="utf-8"?>
+<file path=ppt/slides/slide17.xml><?xml version="1.0" encoding="utf-8"?>
 <p:sld xmlns:a="http://schemas.openxmlformats.org/drawingml/2006/main" xmlns:r="http://schemas.openxmlformats.org/officeDocument/2006/relationships" xmlns:p="http://schemas.openxmlformats.org/presentationml/2006/main">
   <p:cSld>
     <p:spTree>
@@ -3691,16 +6130,45 @@
           <a:p>
             <a:r>
               <a:rPr lang="pt-BR" dirty="0" smtClean="0"/>
-              <a:t>(Colocar um sumário da apresentação)</a:t>
+              <a:t>Contextualização;</a:t>
             </a:r>
           </a:p>
           <a:p>
             <a:r>
               <a:rPr lang="pt-BR" dirty="0" smtClean="0"/>
-              <a:t>(Tempo estimado – 1 minuto)</a:t>
-            </a:r>
-          </a:p>
-          <a:p>
+              <a:t>Fundamentação teórica;</a:t>
+            </a:r>
+          </a:p>
+          <a:p>
+            <a:r>
+              <a:rPr lang="pt-BR" dirty="0" smtClean="0"/>
+              <a:t>Trabalhos correlatos;</a:t>
+            </a:r>
+            <a:endParaRPr lang="pt-BR" dirty="0" smtClean="0"/>
+          </a:p>
+          <a:p>
+            <a:r>
+              <a:rPr lang="pt-BR" dirty="0" smtClean="0"/>
+              <a:t>Descrição da pesquisa;</a:t>
+            </a:r>
+          </a:p>
+          <a:p>
+            <a:r>
+              <a:rPr lang="pt-BR" dirty="0" smtClean="0"/>
+              <a:t>Resultados;</a:t>
+            </a:r>
+          </a:p>
+          <a:p>
+            <a:r>
+              <a:rPr lang="pt-BR" dirty="0" smtClean="0"/>
+              <a:t>Extensões;</a:t>
+            </a:r>
+          </a:p>
+          <a:p>
+            <a:r>
+              <a:rPr lang="pt-BR" dirty="0" smtClean="0"/>
+              <a:t>Conclusões.</a:t>
+            </a:r>
             <a:endParaRPr lang="pt-BR" dirty="0" smtClean="0"/>
           </a:p>
           <a:p>
@@ -3787,16 +6255,8 @@
           <a:p>
             <a:r>
               <a:rPr lang="pt-BR" dirty="0" smtClean="0"/>
-              <a:t>(Contextualizar o trabalho – Como ele surgiu? Por que é importante?)</a:t>
-            </a:r>
-          </a:p>
-          <a:p>
-            <a:r>
-              <a:rPr lang="pt-BR" dirty="0" smtClean="0"/>
-              <a:t>(Tempo estimado – 2 minutos)</a:t>
-            </a:r>
-          </a:p>
-          <a:p>
+              <a:t>a</a:t>
+            </a:r>
             <a:endParaRPr lang="pt-BR" dirty="0" smtClean="0"/>
           </a:p>
           <a:p>
@@ -3883,19 +6343,70 @@
           <a:p>
             <a:r>
               <a:rPr lang="pt-BR" dirty="0" smtClean="0"/>
-              <a:t>(Objetivo geral e específicos – cuidado para as letras não ficarem pequenas. Tamanho mínimo recomendado: 18)</a:t>
-            </a:r>
-          </a:p>
-          <a:p>
+              <a:t>Objetivo geral: </a:t>
+            </a:r>
             <a:r>
               <a:rPr lang="pt-BR" dirty="0" smtClean="0"/>
-              <a:t>(Tempo estimado – 1 minuto)</a:t>
-            </a:r>
-          </a:p>
-          <a:p>
-            <a:endParaRPr lang="pt-BR" dirty="0" smtClean="0"/>
-          </a:p>
-          <a:p>
+              <a:t>desenvolver </a:t>
+            </a:r>
+            <a:r>
+              <a:rPr lang="pt-BR" dirty="0"/>
+              <a:t>uma aplicação para fazer testes de localização em ambientes </a:t>
+            </a:r>
+            <a:r>
+              <a:rPr lang="pt-BR" dirty="0" smtClean="0"/>
+              <a:t>internos.</a:t>
+            </a:r>
+          </a:p>
+          <a:p>
+            <a:r>
+              <a:rPr lang="pt-BR" dirty="0" smtClean="0"/>
+              <a:t>Objetivos específicos:</a:t>
+            </a:r>
+          </a:p>
+          <a:p>
+            <a:pPr lvl="1"/>
+            <a:r>
+              <a:rPr lang="pt-BR" dirty="0"/>
+              <a:t>permitir localizar o usuário em um ambiente interno</a:t>
+            </a:r>
+            <a:r>
+              <a:rPr lang="pt-BR" dirty="0" smtClean="0"/>
+              <a:t>;</a:t>
+            </a:r>
+          </a:p>
+          <a:p>
+            <a:pPr lvl="1"/>
+            <a:r>
+              <a:rPr lang="pt-BR" dirty="0"/>
+              <a:t>utilizar </a:t>
+            </a:r>
+            <a:r>
+              <a:rPr lang="pt-BR" i="1" dirty="0"/>
+              <a:t>beacons</a:t>
+            </a:r>
+            <a:r>
+              <a:rPr lang="pt-BR" dirty="0"/>
+              <a:t> </a:t>
+            </a:r>
+            <a:r>
+              <a:rPr lang="pt-BR" i="1" dirty="0"/>
+              <a:t>bluetooth</a:t>
+            </a:r>
+            <a:r>
+              <a:rPr lang="pt-BR" dirty="0"/>
+              <a:t> como ferramenta;</a:t>
+            </a:r>
+          </a:p>
+          <a:p>
+            <a:pPr lvl="1"/>
+            <a:r>
+              <a:rPr lang="pt-BR" dirty="0"/>
+              <a:t>analisar a precisão da posição obtida.</a:t>
+            </a:r>
+          </a:p>
+          <a:p>
+            <a:pPr lvl="1"/>
             <a:endParaRPr lang="pt-BR" dirty="0"/>
           </a:p>
         </p:txBody>
@@ -3976,22 +6487,8 @@
           <a:lstStyle/>
           <a:p>
             <a:r>
-              <a:rPr lang="pt-BR" dirty="0" smtClean="0"/>
-              <a:t>(Focar nos conceitos, técnicas e ferramentas mais relevantes para a compreensão </a:t>
-            </a:r>
-            <a:r>
-              <a:rPr lang="pt-BR" dirty="0"/>
-              <a:t>d</a:t>
-            </a:r>
-            <a:r>
-              <a:rPr lang="pt-BR" dirty="0" smtClean="0"/>
-              <a:t>o trabalho)</a:t>
-            </a:r>
-          </a:p>
-          <a:p>
-            <a:r>
-              <a:rPr lang="pt-BR" dirty="0" smtClean="0"/>
-              <a:t>(Tempo estimado – 3 minutos)</a:t>
+              <a:rPr lang="pt-BR" b="1" dirty="0"/>
+              <a:t>BEACON</a:t>
             </a:r>
           </a:p>
           <a:p>
@@ -4053,7 +6550,7 @@
           <a:p>
             <a:r>
               <a:rPr lang="pt-BR" dirty="0" smtClean="0"/>
-              <a:t>Trabalhos Correlatos</a:t>
+              <a:t>Fundamentação Teórica</a:t>
             </a:r>
             <a:endParaRPr lang="pt-BR" dirty="0"/>
           </a:p>
@@ -4075,14 +6572,8 @@
           <a:lstStyle/>
           <a:p>
             <a:r>
-              <a:rPr lang="pt-BR" dirty="0" smtClean="0"/>
-              <a:t>(Abordar as características essenciais dos correlatos)</a:t>
-            </a:r>
-          </a:p>
-          <a:p>
-            <a:r>
-              <a:rPr lang="pt-BR" dirty="0" smtClean="0"/>
-              <a:t>(Tempo estimado – 2 minutos)</a:t>
+              <a:rPr lang="pt-BR" b="1" dirty="0"/>
+              <a:t>BEACON</a:t>
             </a:r>
           </a:p>
           <a:p>
@@ -4093,7 +6584,7 @@
     </p:spTree>
     <p:extLst>
       <p:ext uri="{BB962C8B-B14F-4D97-AF65-F5344CB8AC3E}">
-        <p14:creationId xmlns:p14="http://schemas.microsoft.com/office/powerpoint/2010/main" val="1958979546"/>
+        <p14:creationId xmlns:p14="http://schemas.microsoft.com/office/powerpoint/2010/main" val="2264563336"/>
       </p:ext>
     </p:extLst>
   </p:cSld>
@@ -4144,7 +6635,7 @@
           <a:p>
             <a:r>
               <a:rPr lang="pt-BR" dirty="0" smtClean="0"/>
-              <a:t>Requisitos</a:t>
+              <a:t>Fundamentação Teórica</a:t>
             </a:r>
             <a:endParaRPr lang="pt-BR" dirty="0"/>
           </a:p>
@@ -4166,15 +6657,12 @@
           <a:lstStyle/>
           <a:p>
             <a:r>
-              <a:rPr lang="pt-BR" dirty="0" smtClean="0"/>
-              <a:t>(Apresentar os requisitos funcionais e não funcionais do trabalho)</a:t>
-            </a:r>
-          </a:p>
-          <a:p>
-            <a:r>
-              <a:rPr lang="pt-BR" dirty="0" smtClean="0"/>
-              <a:t>(Tempo estimado – 2 minutos)</a:t>
-            </a:r>
+              <a:rPr lang="pt-BR" b="1" dirty="0"/>
+              <a:t>RSSI</a:t>
+            </a:r>
+          </a:p>
+          <a:p>
+            <a:endParaRPr lang="pt-BR" b="1" dirty="0"/>
           </a:p>
           <a:p>
             <a:endParaRPr lang="pt-BR" dirty="0"/>
@@ -4184,7 +6672,7 @@
     </p:spTree>
     <p:extLst>
       <p:ext uri="{BB962C8B-B14F-4D97-AF65-F5344CB8AC3E}">
-        <p14:creationId xmlns:p14="http://schemas.microsoft.com/office/powerpoint/2010/main" val="1997644590"/>
+        <p14:creationId xmlns:p14="http://schemas.microsoft.com/office/powerpoint/2010/main" val="3674152484"/>
       </p:ext>
     </p:extLst>
   </p:cSld>
@@ -4235,7 +6723,7 @@
           <a:p>
             <a:r>
               <a:rPr lang="pt-BR" dirty="0" smtClean="0"/>
-              <a:t>Especificação</a:t>
+              <a:t>Fundamentação Teórica</a:t>
             </a:r>
             <a:endParaRPr lang="pt-BR" dirty="0"/>
           </a:p>
@@ -4257,21 +6745,15 @@
           <a:lstStyle/>
           <a:p>
             <a:r>
-              <a:rPr lang="pt-BR" dirty="0" smtClean="0"/>
-              <a:t>(Apresentar os principais diagramas desenvolvidos na especificação e que permitem compreender os elementos essenciais do trabalho)</a:t>
-            </a:r>
-          </a:p>
-          <a:p>
-            <a:r>
-              <a:rPr lang="pt-BR" dirty="0" smtClean="0"/>
-              <a:t>(Cuidado com a legibilidade das figuras – redesenhe-as caso necessário)</a:t>
-            </a:r>
-          </a:p>
-          <a:p>
-            <a:r>
-              <a:rPr lang="pt-BR" dirty="0" smtClean="0"/>
-              <a:t>(Tempo estimado – 8 minutos)</a:t>
-            </a:r>
+              <a:rPr lang="pt-BR" b="1" dirty="0"/>
+              <a:t>TRILATERAÇÃO</a:t>
+            </a:r>
+          </a:p>
+          <a:p>
+            <a:endParaRPr lang="pt-BR" b="1" dirty="0"/>
+          </a:p>
+          <a:p>
+            <a:endParaRPr lang="pt-BR" b="1" dirty="0"/>
           </a:p>
           <a:p>
             <a:endParaRPr lang="pt-BR" dirty="0"/>
@@ -4281,7 +6763,7 @@
     </p:spTree>
     <p:extLst>
       <p:ext uri="{BB962C8B-B14F-4D97-AF65-F5344CB8AC3E}">
-        <p14:creationId xmlns:p14="http://schemas.microsoft.com/office/powerpoint/2010/main" val="2007070856"/>
+        <p14:creationId xmlns:p14="http://schemas.microsoft.com/office/powerpoint/2010/main" val="2053611848"/>
       </p:ext>
     </p:extLst>
   </p:cSld>
@@ -4332,7 +6814,7 @@
           <a:p>
             <a:r>
               <a:rPr lang="pt-BR" dirty="0" smtClean="0"/>
-              <a:t>Implementação</a:t>
+              <a:t>Fundamentação Teórica</a:t>
             </a:r>
             <a:endParaRPr lang="pt-BR" dirty="0"/>
           </a:p>
@@ -4354,15 +6836,18 @@
           <a:lstStyle/>
           <a:p>
             <a:r>
-              <a:rPr lang="pt-BR" dirty="0" smtClean="0"/>
-              <a:t>(Focar nas principais técnicas e/ou algoritmos implementados)</a:t>
-            </a:r>
-          </a:p>
-          <a:p>
-            <a:r>
-              <a:rPr lang="pt-BR" dirty="0" smtClean="0"/>
-              <a:t>(Tempo estimado – 4 minutos)</a:t>
-            </a:r>
+              <a:rPr lang="pt-BR" b="1" dirty="0"/>
+              <a:t>TÉCNICA FINGERPRINT</a:t>
+            </a:r>
+          </a:p>
+          <a:p>
+            <a:endParaRPr lang="pt-BR" b="1" dirty="0"/>
+          </a:p>
+          <a:p>
+            <a:endParaRPr lang="pt-BR" b="1" dirty="0"/>
+          </a:p>
+          <a:p>
+            <a:endParaRPr lang="pt-BR" b="1" dirty="0"/>
           </a:p>
           <a:p>
             <a:endParaRPr lang="pt-BR" dirty="0"/>
@@ -4372,7 +6857,7 @@
     </p:spTree>
     <p:extLst>
       <p:ext uri="{BB962C8B-B14F-4D97-AF65-F5344CB8AC3E}">
-        <p14:creationId xmlns:p14="http://schemas.microsoft.com/office/powerpoint/2010/main" val="3063325790"/>
+        <p14:creationId xmlns:p14="http://schemas.microsoft.com/office/powerpoint/2010/main" val="4047481071"/>
       </p:ext>
     </p:extLst>
   </p:cSld>
@@ -5105,4 +7590,265 @@
     </a:extraClrScheme>
   </a:extraClrSchemeLst>
 </a:theme>
+</file>
+
+<file path=ppt/theme/theme2.xml><?xml version="1.0" encoding="utf-8"?>
+<a:theme xmlns:a="http://schemas.openxmlformats.org/drawingml/2006/main" name="Office Theme">
+  <a:themeElements>
+    <a:clrScheme name="Office">
+      <a:dk1>
+        <a:sysClr val="windowText" lastClr="000000"/>
+      </a:dk1>
+      <a:lt1>
+        <a:sysClr val="window" lastClr="FFFFFF"/>
+      </a:lt1>
+      <a:dk2>
+        <a:srgbClr val="44546A"/>
+      </a:dk2>
+      <a:lt2>
+        <a:srgbClr val="E7E6E6"/>
+      </a:lt2>
+      <a:accent1>
+        <a:srgbClr val="5B9BD5"/>
+      </a:accent1>
+      <a:accent2>
+        <a:srgbClr val="ED7D31"/>
+      </a:accent2>
+      <a:accent3>
+        <a:srgbClr val="A5A5A5"/>
+      </a:accent3>
+      <a:accent4>
+        <a:srgbClr val="FFC000"/>
+      </a:accent4>
+      <a:accent5>
+        <a:srgbClr val="4472C4"/>
+      </a:accent5>
+      <a:accent6>
+        <a:srgbClr val="70AD47"/>
+      </a:accent6>
+      <a:hlink>
+        <a:srgbClr val="0563C1"/>
+      </a:hlink>
+      <a:folHlink>
+        <a:srgbClr val="954F72"/>
+      </a:folHlink>
+    </a:clrScheme>
+    <a:fontScheme name="Office">
+      <a:majorFont>
+        <a:latin typeface="Calibri Light" panose="020F0302020204030204"/>
+        <a:ea typeface=""/>
+        <a:cs typeface=""/>
+        <a:font script="Jpan" typeface="游ゴシック Light"/>
+        <a:font script="Hang" typeface="맑은 고딕"/>
+        <a:font script="Hans" typeface="等线 Light"/>
+        <a:font script="Hant" typeface="新細明體"/>
+        <a:font script="Arab" typeface="Times New Roman"/>
+        <a:font script="Hebr" typeface="Times New Roman"/>
+        <a:font script="Thai" typeface="Angsana New"/>
+        <a:font script="Ethi" typeface="Nyala"/>
+        <a:font script="Beng" typeface="Vrinda"/>
+        <a:font script="Gujr" typeface="Shruti"/>
+        <a:font script="Khmr" typeface="MoolBoran"/>
+        <a:font script="Knda" typeface="Tunga"/>
+        <a:font script="Guru" typeface="Raavi"/>
+        <a:font script="Cans" typeface="Euphemia"/>
+        <a:font script="Cher" typeface="Plantagenet Cherokee"/>
+        <a:font script="Yiii" typeface="Microsoft Yi Baiti"/>
+        <a:font script="Tibt" typeface="Microsoft Himalaya"/>
+        <a:font script="Thaa" typeface="MV Boli"/>
+        <a:font script="Deva" typeface="Mangal"/>
+        <a:font script="Telu" typeface="Gautami"/>
+        <a:font script="Taml" typeface="Latha"/>
+        <a:font script="Syrc" typeface="Estrangelo Edessa"/>
+        <a:font script="Orya" typeface="Kalinga"/>
+        <a:font script="Mlym" typeface="Kartika"/>
+        <a:font script="Laoo" typeface="DokChampa"/>
+        <a:font script="Sinh" typeface="Iskoola Pota"/>
+        <a:font script="Mong" typeface="Mongolian Baiti"/>
+        <a:font script="Viet" typeface="Times New Roman"/>
+        <a:font script="Uigh" typeface="Microsoft Uighur"/>
+        <a:font script="Geor" typeface="Sylfaen"/>
+      </a:majorFont>
+      <a:minorFont>
+        <a:latin typeface="Calibri" panose="020F0502020204030204"/>
+        <a:ea typeface=""/>
+        <a:cs typeface=""/>
+        <a:font script="Jpan" typeface="游ゴシック"/>
+        <a:font script="Hang" typeface="맑은 고딕"/>
+        <a:font script="Hans" typeface="等线"/>
+        <a:font script="Hant" typeface="新細明體"/>
+        <a:font script="Arab" typeface="Arial"/>
+        <a:font script="Hebr" typeface="Arial"/>
+        <a:font script="Thai" typeface="Cordia New"/>
+        <a:font script="Ethi" typeface="Nyala"/>
+        <a:font script="Beng" typeface="Vrinda"/>
+        <a:font script="Gujr" typeface="Shruti"/>
+        <a:font script="Khmr" typeface="DaunPenh"/>
+        <a:font script="Knda" typeface="Tunga"/>
+        <a:font script="Guru" typeface="Raavi"/>
+        <a:font script="Cans" typeface="Euphemia"/>
+        <a:font script="Cher" typeface="Plantagenet Cherokee"/>
+        <a:font script="Yiii" typeface="Microsoft Yi Baiti"/>
+        <a:font script="Tibt" typeface="Microsoft Himalaya"/>
+        <a:font script="Thaa" typeface="MV Boli"/>
+        <a:font script="Deva" typeface="Mangal"/>
+        <a:font script="Telu" typeface="Gautami"/>
+        <a:font script="Taml" typeface="Latha"/>
+        <a:font script="Syrc" typeface="Estrangelo Edessa"/>
+        <a:font script="Orya" typeface="Kalinga"/>
+        <a:font script="Mlym" typeface="Kartika"/>
+        <a:font script="Laoo" typeface="DokChampa"/>
+        <a:font script="Sinh" typeface="Iskoola Pota"/>
+        <a:font script="Mong" typeface="Mongolian Baiti"/>
+        <a:font script="Viet" typeface="Arial"/>
+        <a:font script="Uigh" typeface="Microsoft Uighur"/>
+        <a:font script="Geor" typeface="Sylfaen"/>
+      </a:minorFont>
+    </a:fontScheme>
+    <a:fmtScheme name="Office">
+      <a:fillStyleLst>
+        <a:solidFill>
+          <a:schemeClr val="phClr"/>
+        </a:solidFill>
+        <a:gradFill rotWithShape="1">
+          <a:gsLst>
+            <a:gs pos="0">
+              <a:schemeClr val="phClr">
+                <a:lumMod val="110000"/>
+                <a:satMod val="105000"/>
+                <a:tint val="67000"/>
+              </a:schemeClr>
+            </a:gs>
+            <a:gs pos="50000">
+              <a:schemeClr val="phClr">
+                <a:lumMod val="105000"/>
+                <a:satMod val="103000"/>
+                <a:tint val="73000"/>
+              </a:schemeClr>
+            </a:gs>
+            <a:gs pos="100000">
+              <a:schemeClr val="phClr">
+                <a:lumMod val="105000"/>
+                <a:satMod val="109000"/>
+                <a:tint val="81000"/>
+              </a:schemeClr>
+            </a:gs>
+          </a:gsLst>
+          <a:lin ang="5400000" scaled="0"/>
+        </a:gradFill>
+        <a:gradFill rotWithShape="1">
+          <a:gsLst>
+            <a:gs pos="0">
+              <a:schemeClr val="phClr">
+                <a:satMod val="103000"/>
+                <a:lumMod val="102000"/>
+                <a:tint val="94000"/>
+              </a:schemeClr>
+            </a:gs>
+            <a:gs pos="50000">
+              <a:schemeClr val="phClr">
+                <a:satMod val="110000"/>
+                <a:lumMod val="100000"/>
+                <a:shade val="100000"/>
+              </a:schemeClr>
+            </a:gs>
+            <a:gs pos="100000">
+              <a:schemeClr val="phClr">
+                <a:lumMod val="99000"/>
+                <a:satMod val="120000"/>
+                <a:shade val="78000"/>
+              </a:schemeClr>
+            </a:gs>
+          </a:gsLst>
+          <a:lin ang="5400000" scaled="0"/>
+        </a:gradFill>
+      </a:fillStyleLst>
+      <a:lnStyleLst>
+        <a:ln w="6350" cap="flat" cmpd="sng" algn="ctr">
+          <a:solidFill>
+            <a:schemeClr val="phClr"/>
+          </a:solidFill>
+          <a:prstDash val="solid"/>
+          <a:miter lim="800000"/>
+        </a:ln>
+        <a:ln w="12700" cap="flat" cmpd="sng" algn="ctr">
+          <a:solidFill>
+            <a:schemeClr val="phClr"/>
+          </a:solidFill>
+          <a:prstDash val="solid"/>
+          <a:miter lim="800000"/>
+        </a:ln>
+        <a:ln w="19050" cap="flat" cmpd="sng" algn="ctr">
+          <a:solidFill>
+            <a:schemeClr val="phClr"/>
+          </a:solidFill>
+          <a:prstDash val="solid"/>
+          <a:miter lim="800000"/>
+        </a:ln>
+      </a:lnStyleLst>
+      <a:effectStyleLst>
+        <a:effectStyle>
+          <a:effectLst/>
+        </a:effectStyle>
+        <a:effectStyle>
+          <a:effectLst/>
+        </a:effectStyle>
+        <a:effectStyle>
+          <a:effectLst>
+            <a:outerShdw blurRad="57150" dist="19050" dir="5400000" algn="ctr" rotWithShape="0">
+              <a:srgbClr val="000000">
+                <a:alpha val="63000"/>
+              </a:srgbClr>
+            </a:outerShdw>
+          </a:effectLst>
+        </a:effectStyle>
+      </a:effectStyleLst>
+      <a:bgFillStyleLst>
+        <a:solidFill>
+          <a:schemeClr val="phClr"/>
+        </a:solidFill>
+        <a:solidFill>
+          <a:schemeClr val="phClr">
+            <a:tint val="95000"/>
+            <a:satMod val="170000"/>
+          </a:schemeClr>
+        </a:solidFill>
+        <a:gradFill rotWithShape="1">
+          <a:gsLst>
+            <a:gs pos="0">
+              <a:schemeClr val="phClr">
+                <a:tint val="93000"/>
+                <a:satMod val="150000"/>
+                <a:shade val="98000"/>
+                <a:lumMod val="102000"/>
+              </a:schemeClr>
+            </a:gs>
+            <a:gs pos="50000">
+              <a:schemeClr val="phClr">
+                <a:tint val="98000"/>
+                <a:satMod val="130000"/>
+                <a:shade val="90000"/>
+                <a:lumMod val="103000"/>
+              </a:schemeClr>
+            </a:gs>
+            <a:gs pos="100000">
+              <a:schemeClr val="phClr">
+                <a:shade val="63000"/>
+                <a:satMod val="120000"/>
+              </a:schemeClr>
+            </a:gs>
+          </a:gsLst>
+          <a:lin ang="5400000" scaled="0"/>
+        </a:gradFill>
+      </a:bgFillStyleLst>
+    </a:fmtScheme>
+  </a:themeElements>
+  <a:objectDefaults/>
+  <a:extraClrSchemeLst/>
+  <a:extLst>
+    <a:ext uri="{05A4C25C-085E-4340-85A3-A5531E510DB2}">
+      <thm15:themeFamily xmlns:thm15="http://schemas.microsoft.com/office/thememl/2012/main" name="Office Theme" id="{62F939B6-93AF-4DB8-9C6B-D6C7DFDC589F}" vid="{4A3C46E8-61CC-4603-A589-7422A47A8E4A}"/>
+    </a:ext>
+  </a:extLst>
+</a:theme>
 </file>
</xml_diff>